<commit_message>
update auth enc lite
</commit_message>
<xml_diff>
--- a/Lectures/AutenticEncryptionLite.pptx
+++ b/Lectures/AutenticEncryptionLite.pptx
@@ -282,7 +282,7 @@
           <a:p>
             <a:fld id="{CBA08D16-15DC-4E25-BDC3-F25146157B16}" type="datetimeFigureOut">
               <a:rPr lang="ru-RU" smtClean="0"/>
-              <a:t>12.09.2024</a:t>
+              <a:t>16.04.2025</a:t>
             </a:fld>
             <a:endParaRPr lang="ru-RU"/>
           </a:p>
@@ -346,38 +346,37 @@
           <a:p>
             <a:pPr lvl="0"/>
             <a:r>
-              <a:rPr lang="ru-RU" smtClean="0"/>
+              <a:rPr lang="ru-RU"/>
               <a:t>Образец текста</a:t>
             </a:r>
           </a:p>
           <a:p>
             <a:pPr lvl="1"/>
             <a:r>
-              <a:rPr lang="ru-RU" smtClean="0"/>
+              <a:rPr lang="ru-RU"/>
               <a:t>Второй уровень</a:t>
             </a:r>
           </a:p>
           <a:p>
             <a:pPr lvl="2"/>
             <a:r>
-              <a:rPr lang="ru-RU" smtClean="0"/>
+              <a:rPr lang="ru-RU"/>
               <a:t>Третий уровень</a:t>
             </a:r>
           </a:p>
           <a:p>
             <a:pPr lvl="3"/>
             <a:r>
-              <a:rPr lang="ru-RU" smtClean="0"/>
+              <a:rPr lang="ru-RU"/>
               <a:t>Четвертый уровень</a:t>
             </a:r>
           </a:p>
           <a:p>
             <a:pPr lvl="4"/>
             <a:r>
-              <a:rPr lang="ru-RU" smtClean="0"/>
+              <a:rPr lang="ru-RU"/>
               <a:t>Пятый уровень</a:t>
             </a:r>
-            <a:endParaRPr lang="ru-RU"/>
           </a:p>
         </p:txBody>
       </p:sp>
@@ -595,11 +594,11 @@
           <a:lstStyle/>
           <a:p>
             <a:r>
-              <a:rPr lang="en-US" dirty="0" smtClean="0"/>
+              <a:rPr lang="en-US" dirty="0"/>
               <a:t>Without integrity,</a:t>
             </a:r>
             <a:r>
-              <a:rPr lang="en-US" baseline="0" dirty="0" smtClean="0"/>
+              <a:rPr lang="en-US" baseline="0" dirty="0"/>
               <a:t> one cannot ensure confidentiality.</a:t>
             </a:r>
             <a:endParaRPr lang="en-US" dirty="0"/>
@@ -685,10 +684,9 @@
           </a:lstStyle>
           <a:p>
             <a:r>
-              <a:rPr lang="ru-RU" smtClean="0"/>
+              <a:rPr lang="ru-RU"/>
               <a:t>Образец заголовка</a:t>
             </a:r>
-            <a:endParaRPr lang="ru-RU"/>
           </a:p>
         </p:txBody>
       </p:sp>
@@ -750,10 +748,9 @@
           </a:lstStyle>
           <a:p>
             <a:r>
-              <a:rPr lang="ru-RU" smtClean="0"/>
+              <a:rPr lang="ru-RU"/>
               <a:t>Образец подзаголовка</a:t>
             </a:r>
-            <a:endParaRPr lang="ru-RU"/>
           </a:p>
         </p:txBody>
       </p:sp>
@@ -774,7 +771,7 @@
           <a:p>
             <a:fld id="{FCEC8293-DB51-454A-BE81-EC8FCB31EBA2}" type="datetime1">
               <a:rPr lang="ru-RU" smtClean="0"/>
-              <a:t>12.09.2024</a:t>
+              <a:t>16.04.2025</a:t>
             </a:fld>
             <a:endParaRPr lang="ru-RU"/>
           </a:p>
@@ -796,10 +793,9 @@
           <a:lstStyle/>
           <a:p>
             <a:r>
-              <a:rPr lang="ru-RU" smtClean="0"/>
+              <a:rPr lang="ru-RU"/>
               <a:t>Артём Макаров</a:t>
             </a:r>
-            <a:endParaRPr lang="ru-RU"/>
           </a:p>
         </p:txBody>
       </p:sp>
@@ -872,10 +868,9 @@
           <a:lstStyle/>
           <a:p>
             <a:r>
-              <a:rPr lang="ru-RU" smtClean="0"/>
+              <a:rPr lang="ru-RU"/>
               <a:t>Образец заголовка</a:t>
             </a:r>
-            <a:endParaRPr lang="ru-RU"/>
           </a:p>
         </p:txBody>
       </p:sp>
@@ -896,38 +891,37 @@
           <a:p>
             <a:pPr lvl="0"/>
             <a:r>
-              <a:rPr lang="ru-RU" smtClean="0"/>
+              <a:rPr lang="ru-RU"/>
               <a:t>Образец текста</a:t>
             </a:r>
           </a:p>
           <a:p>
             <a:pPr lvl="1"/>
             <a:r>
-              <a:rPr lang="ru-RU" smtClean="0"/>
+              <a:rPr lang="ru-RU"/>
               <a:t>Второй уровень</a:t>
             </a:r>
           </a:p>
           <a:p>
             <a:pPr lvl="2"/>
             <a:r>
-              <a:rPr lang="ru-RU" smtClean="0"/>
+              <a:rPr lang="ru-RU"/>
               <a:t>Третий уровень</a:t>
             </a:r>
           </a:p>
           <a:p>
             <a:pPr lvl="3"/>
             <a:r>
-              <a:rPr lang="ru-RU" smtClean="0"/>
+              <a:rPr lang="ru-RU"/>
               <a:t>Четвертый уровень</a:t>
             </a:r>
           </a:p>
           <a:p>
             <a:pPr lvl="4"/>
             <a:r>
-              <a:rPr lang="ru-RU" smtClean="0"/>
+              <a:rPr lang="ru-RU"/>
               <a:t>Пятый уровень</a:t>
             </a:r>
-            <a:endParaRPr lang="ru-RU"/>
           </a:p>
         </p:txBody>
       </p:sp>
@@ -948,7 +942,7 @@
           <a:p>
             <a:fld id="{241C87B1-1C35-4DBD-BC18-2BC72E776603}" type="datetime1">
               <a:rPr lang="ru-RU" smtClean="0"/>
-              <a:t>12.09.2024</a:t>
+              <a:t>16.04.2025</a:t>
             </a:fld>
             <a:endParaRPr lang="ru-RU"/>
           </a:p>
@@ -970,10 +964,9 @@
           <a:lstStyle/>
           <a:p>
             <a:r>
-              <a:rPr lang="ru-RU" smtClean="0"/>
+              <a:rPr lang="ru-RU"/>
               <a:t>Артём Макаров</a:t>
             </a:r>
-            <a:endParaRPr lang="ru-RU"/>
           </a:p>
         </p:txBody>
       </p:sp>
@@ -1051,10 +1044,9 @@
           <a:lstStyle/>
           <a:p>
             <a:r>
-              <a:rPr lang="ru-RU" smtClean="0"/>
+              <a:rPr lang="ru-RU"/>
               <a:t>Образец заголовка</a:t>
             </a:r>
-            <a:endParaRPr lang="ru-RU"/>
           </a:p>
         </p:txBody>
       </p:sp>
@@ -1080,38 +1072,37 @@
           <a:p>
             <a:pPr lvl="0"/>
             <a:r>
-              <a:rPr lang="ru-RU" smtClean="0"/>
+              <a:rPr lang="ru-RU"/>
               <a:t>Образец текста</a:t>
             </a:r>
           </a:p>
           <a:p>
             <a:pPr lvl="1"/>
             <a:r>
-              <a:rPr lang="ru-RU" smtClean="0"/>
+              <a:rPr lang="ru-RU"/>
               <a:t>Второй уровень</a:t>
             </a:r>
           </a:p>
           <a:p>
             <a:pPr lvl="2"/>
             <a:r>
-              <a:rPr lang="ru-RU" smtClean="0"/>
+              <a:rPr lang="ru-RU"/>
               <a:t>Третий уровень</a:t>
             </a:r>
           </a:p>
           <a:p>
             <a:pPr lvl="3"/>
             <a:r>
-              <a:rPr lang="ru-RU" smtClean="0"/>
+              <a:rPr lang="ru-RU"/>
               <a:t>Четвертый уровень</a:t>
             </a:r>
           </a:p>
           <a:p>
             <a:pPr lvl="4"/>
             <a:r>
-              <a:rPr lang="ru-RU" smtClean="0"/>
+              <a:rPr lang="ru-RU"/>
               <a:t>Пятый уровень</a:t>
             </a:r>
-            <a:endParaRPr lang="ru-RU"/>
           </a:p>
         </p:txBody>
       </p:sp>
@@ -1132,7 +1123,7 @@
           <a:p>
             <a:fld id="{3134C275-26C0-42CD-9111-9ADE65922AF9}" type="datetime1">
               <a:rPr lang="ru-RU" smtClean="0"/>
-              <a:t>12.09.2024</a:t>
+              <a:t>16.04.2025</a:t>
             </a:fld>
             <a:endParaRPr lang="ru-RU"/>
           </a:p>
@@ -1154,10 +1145,9 @@
           <a:lstStyle/>
           <a:p>
             <a:r>
-              <a:rPr lang="ru-RU" smtClean="0"/>
+              <a:rPr lang="ru-RU"/>
               <a:t>Артём Макаров</a:t>
             </a:r>
-            <a:endParaRPr lang="ru-RU"/>
           </a:p>
         </p:txBody>
       </p:sp>
@@ -1230,10 +1220,9 @@
           <a:lstStyle/>
           <a:p>
             <a:r>
-              <a:rPr lang="ru-RU" smtClean="0"/>
+              <a:rPr lang="ru-RU"/>
               <a:t>Образец заголовка</a:t>
             </a:r>
-            <a:endParaRPr lang="ru-RU"/>
           </a:p>
         </p:txBody>
       </p:sp>
@@ -1254,38 +1243,37 @@
           <a:p>
             <a:pPr lvl="0"/>
             <a:r>
-              <a:rPr lang="ru-RU" dirty="0" smtClean="0"/>
+              <a:rPr lang="ru-RU" dirty="0"/>
               <a:t>Образец текста</a:t>
             </a:r>
           </a:p>
           <a:p>
             <a:pPr lvl="1"/>
             <a:r>
-              <a:rPr lang="ru-RU" dirty="0" smtClean="0"/>
+              <a:rPr lang="ru-RU" dirty="0"/>
               <a:t>Второй уровень</a:t>
             </a:r>
           </a:p>
           <a:p>
             <a:pPr lvl="2"/>
             <a:r>
-              <a:rPr lang="ru-RU" dirty="0" smtClean="0"/>
+              <a:rPr lang="ru-RU" dirty="0"/>
               <a:t>Третий уровень</a:t>
             </a:r>
           </a:p>
           <a:p>
             <a:pPr lvl="3"/>
             <a:r>
-              <a:rPr lang="ru-RU" dirty="0" smtClean="0"/>
+              <a:rPr lang="ru-RU" dirty="0"/>
               <a:t>Четвертый уровень</a:t>
             </a:r>
           </a:p>
           <a:p>
             <a:pPr lvl="4"/>
             <a:r>
-              <a:rPr lang="ru-RU" dirty="0" smtClean="0"/>
+              <a:rPr lang="ru-RU" dirty="0"/>
               <a:t>Пятый уровень</a:t>
             </a:r>
-            <a:endParaRPr lang="ru-RU" dirty="0"/>
           </a:p>
         </p:txBody>
       </p:sp>
@@ -1306,7 +1294,7 @@
           <a:p>
             <a:fld id="{C1A9A50B-C350-45F5-8AAB-ADB9E670AF2E}" type="datetime1">
               <a:rPr lang="ru-RU" smtClean="0"/>
-              <a:t>12.09.2024</a:t>
+              <a:t>16.04.2025</a:t>
             </a:fld>
             <a:endParaRPr lang="ru-RU"/>
           </a:p>
@@ -1328,10 +1316,9 @@
           <a:lstStyle/>
           <a:p>
             <a:r>
-              <a:rPr lang="ru-RU" smtClean="0"/>
+              <a:rPr lang="ru-RU"/>
               <a:t>Артём Макаров</a:t>
             </a:r>
-            <a:endParaRPr lang="ru-RU"/>
           </a:p>
         </p:txBody>
       </p:sp>
@@ -1413,10 +1400,9 @@
           </a:lstStyle>
           <a:p>
             <a:r>
-              <a:rPr lang="ru-RU" smtClean="0"/>
+              <a:rPr lang="ru-RU"/>
               <a:t>Образец заголовка</a:t>
             </a:r>
-            <a:endParaRPr lang="ru-RU"/>
           </a:p>
         </p:txBody>
       </p:sp>
@@ -1533,7 +1519,7 @@
           <a:p>
             <a:pPr lvl="0"/>
             <a:r>
-              <a:rPr lang="ru-RU" smtClean="0"/>
+              <a:rPr lang="ru-RU"/>
               <a:t>Образец текста</a:t>
             </a:r>
           </a:p>
@@ -1556,7 +1542,7 @@
           <a:p>
             <a:fld id="{089688C9-348F-42F9-B6C0-5990DDE0C5B2}" type="datetime1">
               <a:rPr lang="ru-RU" smtClean="0"/>
-              <a:t>12.09.2024</a:t>
+              <a:t>16.04.2025</a:t>
             </a:fld>
             <a:endParaRPr lang="ru-RU"/>
           </a:p>
@@ -1578,10 +1564,9 @@
           <a:lstStyle/>
           <a:p>
             <a:r>
-              <a:rPr lang="ru-RU" smtClean="0"/>
+              <a:rPr lang="ru-RU"/>
               <a:t>Артём Макаров</a:t>
             </a:r>
-            <a:endParaRPr lang="ru-RU"/>
           </a:p>
         </p:txBody>
       </p:sp>
@@ -1654,10 +1639,9 @@
           <a:lstStyle/>
           <a:p>
             <a:r>
-              <a:rPr lang="ru-RU" smtClean="0"/>
+              <a:rPr lang="ru-RU"/>
               <a:t>Образец заголовка</a:t>
             </a:r>
-            <a:endParaRPr lang="ru-RU"/>
           </a:p>
         </p:txBody>
       </p:sp>
@@ -1683,38 +1667,37 @@
           <a:p>
             <a:pPr lvl="0"/>
             <a:r>
-              <a:rPr lang="ru-RU" smtClean="0"/>
+              <a:rPr lang="ru-RU"/>
               <a:t>Образец текста</a:t>
             </a:r>
           </a:p>
           <a:p>
             <a:pPr lvl="1"/>
             <a:r>
-              <a:rPr lang="ru-RU" smtClean="0"/>
+              <a:rPr lang="ru-RU"/>
               <a:t>Второй уровень</a:t>
             </a:r>
           </a:p>
           <a:p>
             <a:pPr lvl="2"/>
             <a:r>
-              <a:rPr lang="ru-RU" smtClean="0"/>
+              <a:rPr lang="ru-RU"/>
               <a:t>Третий уровень</a:t>
             </a:r>
           </a:p>
           <a:p>
             <a:pPr lvl="3"/>
             <a:r>
-              <a:rPr lang="ru-RU" smtClean="0"/>
+              <a:rPr lang="ru-RU"/>
               <a:t>Четвертый уровень</a:t>
             </a:r>
           </a:p>
           <a:p>
             <a:pPr lvl="4"/>
             <a:r>
-              <a:rPr lang="ru-RU" smtClean="0"/>
+              <a:rPr lang="ru-RU"/>
               <a:t>Пятый уровень</a:t>
             </a:r>
-            <a:endParaRPr lang="ru-RU"/>
           </a:p>
         </p:txBody>
       </p:sp>
@@ -1740,38 +1723,37 @@
           <a:p>
             <a:pPr lvl="0"/>
             <a:r>
-              <a:rPr lang="ru-RU" smtClean="0"/>
+              <a:rPr lang="ru-RU"/>
               <a:t>Образец текста</a:t>
             </a:r>
           </a:p>
           <a:p>
             <a:pPr lvl="1"/>
             <a:r>
-              <a:rPr lang="ru-RU" smtClean="0"/>
+              <a:rPr lang="ru-RU"/>
               <a:t>Второй уровень</a:t>
             </a:r>
           </a:p>
           <a:p>
             <a:pPr lvl="2"/>
             <a:r>
-              <a:rPr lang="ru-RU" smtClean="0"/>
+              <a:rPr lang="ru-RU"/>
               <a:t>Третий уровень</a:t>
             </a:r>
           </a:p>
           <a:p>
             <a:pPr lvl="3"/>
             <a:r>
-              <a:rPr lang="ru-RU" smtClean="0"/>
+              <a:rPr lang="ru-RU"/>
               <a:t>Четвертый уровень</a:t>
             </a:r>
           </a:p>
           <a:p>
             <a:pPr lvl="4"/>
             <a:r>
-              <a:rPr lang="ru-RU" smtClean="0"/>
+              <a:rPr lang="ru-RU"/>
               <a:t>Пятый уровень</a:t>
             </a:r>
-            <a:endParaRPr lang="ru-RU"/>
           </a:p>
         </p:txBody>
       </p:sp>
@@ -1792,7 +1774,7 @@
           <a:p>
             <a:fld id="{684AFD8F-6DD9-4AD3-A505-FDC3F5C5F3F6}" type="datetime1">
               <a:rPr lang="ru-RU" smtClean="0"/>
-              <a:t>12.09.2024</a:t>
+              <a:t>16.04.2025</a:t>
             </a:fld>
             <a:endParaRPr lang="ru-RU"/>
           </a:p>
@@ -1814,10 +1796,9 @@
           <a:lstStyle/>
           <a:p>
             <a:r>
-              <a:rPr lang="ru-RU" smtClean="0"/>
+              <a:rPr lang="ru-RU"/>
               <a:t>Артём Макаров</a:t>
             </a:r>
-            <a:endParaRPr lang="ru-RU"/>
           </a:p>
         </p:txBody>
       </p:sp>
@@ -1895,10 +1876,9 @@
           <a:lstStyle/>
           <a:p>
             <a:r>
-              <a:rPr lang="ru-RU" smtClean="0"/>
+              <a:rPr lang="ru-RU"/>
               <a:t>Образец заголовка</a:t>
             </a:r>
-            <a:endParaRPr lang="ru-RU"/>
           </a:p>
         </p:txBody>
       </p:sp>
@@ -1961,7 +1941,7 @@
           <a:p>
             <a:pPr lvl="0"/>
             <a:r>
-              <a:rPr lang="ru-RU" dirty="0" smtClean="0"/>
+              <a:rPr lang="ru-RU" dirty="0"/>
               <a:t>Образец текста</a:t>
             </a:r>
           </a:p>
@@ -1989,38 +1969,37 @@
           <a:p>
             <a:pPr lvl="0"/>
             <a:r>
-              <a:rPr lang="ru-RU" dirty="0" smtClean="0"/>
+              <a:rPr lang="ru-RU" dirty="0"/>
               <a:t>Образец текста</a:t>
             </a:r>
           </a:p>
           <a:p>
             <a:pPr lvl="1"/>
             <a:r>
-              <a:rPr lang="ru-RU" dirty="0" smtClean="0"/>
+              <a:rPr lang="ru-RU" dirty="0"/>
               <a:t>Второй уровень</a:t>
             </a:r>
           </a:p>
           <a:p>
             <a:pPr lvl="2"/>
             <a:r>
-              <a:rPr lang="ru-RU" dirty="0" smtClean="0"/>
+              <a:rPr lang="ru-RU" dirty="0"/>
               <a:t>Третий уровень</a:t>
             </a:r>
           </a:p>
           <a:p>
             <a:pPr lvl="3"/>
             <a:r>
-              <a:rPr lang="ru-RU" dirty="0" smtClean="0"/>
+              <a:rPr lang="ru-RU" dirty="0"/>
               <a:t>Четвертый уровень</a:t>
             </a:r>
           </a:p>
           <a:p>
             <a:pPr lvl="4"/>
             <a:r>
-              <a:rPr lang="ru-RU" dirty="0" smtClean="0"/>
+              <a:rPr lang="ru-RU" dirty="0"/>
               <a:t>Пятый уровень</a:t>
             </a:r>
-            <a:endParaRPr lang="ru-RU" dirty="0"/>
           </a:p>
         </p:txBody>
       </p:sp>
@@ -2083,7 +2062,7 @@
           <a:p>
             <a:pPr lvl="0"/>
             <a:r>
-              <a:rPr lang="ru-RU" smtClean="0"/>
+              <a:rPr lang="ru-RU"/>
               <a:t>Образец текста</a:t>
             </a:r>
           </a:p>
@@ -2111,38 +2090,37 @@
           <a:p>
             <a:pPr lvl="0"/>
             <a:r>
-              <a:rPr lang="ru-RU" smtClean="0"/>
+              <a:rPr lang="ru-RU"/>
               <a:t>Образец текста</a:t>
             </a:r>
           </a:p>
           <a:p>
             <a:pPr lvl="1"/>
             <a:r>
-              <a:rPr lang="ru-RU" smtClean="0"/>
+              <a:rPr lang="ru-RU"/>
               <a:t>Второй уровень</a:t>
             </a:r>
           </a:p>
           <a:p>
             <a:pPr lvl="2"/>
             <a:r>
-              <a:rPr lang="ru-RU" smtClean="0"/>
+              <a:rPr lang="ru-RU"/>
               <a:t>Третий уровень</a:t>
             </a:r>
           </a:p>
           <a:p>
             <a:pPr lvl="3"/>
             <a:r>
-              <a:rPr lang="ru-RU" smtClean="0"/>
+              <a:rPr lang="ru-RU"/>
               <a:t>Четвертый уровень</a:t>
             </a:r>
           </a:p>
           <a:p>
             <a:pPr lvl="4"/>
             <a:r>
-              <a:rPr lang="ru-RU" smtClean="0"/>
+              <a:rPr lang="ru-RU"/>
               <a:t>Пятый уровень</a:t>
             </a:r>
-            <a:endParaRPr lang="ru-RU"/>
           </a:p>
         </p:txBody>
       </p:sp>
@@ -2163,7 +2141,7 @@
           <a:p>
             <a:fld id="{63551EFE-4D02-45EB-A747-8B6F047B5AA0}" type="datetime1">
               <a:rPr lang="ru-RU" smtClean="0"/>
-              <a:t>12.09.2024</a:t>
+              <a:t>16.04.2025</a:t>
             </a:fld>
             <a:endParaRPr lang="ru-RU"/>
           </a:p>
@@ -2185,10 +2163,9 @@
           <a:lstStyle/>
           <a:p>
             <a:r>
-              <a:rPr lang="ru-RU" smtClean="0"/>
+              <a:rPr lang="ru-RU"/>
               <a:t>Артём Макаров</a:t>
             </a:r>
-            <a:endParaRPr lang="ru-RU"/>
           </a:p>
         </p:txBody>
       </p:sp>
@@ -2261,10 +2238,9 @@
           <a:lstStyle/>
           <a:p>
             <a:r>
-              <a:rPr lang="ru-RU" smtClean="0"/>
+              <a:rPr lang="ru-RU"/>
               <a:t>Образец заголовка</a:t>
             </a:r>
-            <a:endParaRPr lang="ru-RU"/>
           </a:p>
         </p:txBody>
       </p:sp>
@@ -2285,7 +2261,7 @@
           <a:p>
             <a:fld id="{813A9F34-E5CD-4B8F-AA9E-889C84372B20}" type="datetime1">
               <a:rPr lang="ru-RU" smtClean="0"/>
-              <a:t>12.09.2024</a:t>
+              <a:t>16.04.2025</a:t>
             </a:fld>
             <a:endParaRPr lang="ru-RU"/>
           </a:p>
@@ -2307,10 +2283,9 @@
           <a:lstStyle/>
           <a:p>
             <a:r>
-              <a:rPr lang="ru-RU" smtClean="0"/>
+              <a:rPr lang="ru-RU"/>
               <a:t>Артём Макаров</a:t>
             </a:r>
-            <a:endParaRPr lang="ru-RU"/>
           </a:p>
         </p:txBody>
       </p:sp>
@@ -2384,7 +2359,7 @@
           <a:p>
             <a:fld id="{51224D22-9B29-44A6-8E82-95FC492DEDC1}" type="datetime1">
               <a:rPr lang="ru-RU" smtClean="0"/>
-              <a:t>12.09.2024</a:t>
+              <a:t>16.04.2025</a:t>
             </a:fld>
             <a:endParaRPr lang="ru-RU"/>
           </a:p>
@@ -2406,10 +2381,9 @@
           <a:lstStyle/>
           <a:p>
             <a:r>
-              <a:rPr lang="ru-RU" smtClean="0"/>
+              <a:rPr lang="ru-RU"/>
               <a:t>Артём Макаров</a:t>
             </a:r>
-            <a:endParaRPr lang="ru-RU"/>
           </a:p>
         </p:txBody>
       </p:sp>
@@ -2491,10 +2465,9 @@
           </a:lstStyle>
           <a:p>
             <a:r>
-              <a:rPr lang="ru-RU" smtClean="0"/>
+              <a:rPr lang="ru-RU"/>
               <a:t>Образец заголовка</a:t>
             </a:r>
-            <a:endParaRPr lang="ru-RU"/>
           </a:p>
         </p:txBody>
       </p:sp>
@@ -2548,38 +2521,37 @@
           <a:p>
             <a:pPr lvl="0"/>
             <a:r>
-              <a:rPr lang="ru-RU" smtClean="0"/>
+              <a:rPr lang="ru-RU"/>
               <a:t>Образец текста</a:t>
             </a:r>
           </a:p>
           <a:p>
             <a:pPr lvl="1"/>
             <a:r>
-              <a:rPr lang="ru-RU" smtClean="0"/>
+              <a:rPr lang="ru-RU"/>
               <a:t>Второй уровень</a:t>
             </a:r>
           </a:p>
           <a:p>
             <a:pPr lvl="2"/>
             <a:r>
-              <a:rPr lang="ru-RU" smtClean="0"/>
+              <a:rPr lang="ru-RU"/>
               <a:t>Третий уровень</a:t>
             </a:r>
           </a:p>
           <a:p>
             <a:pPr lvl="3"/>
             <a:r>
-              <a:rPr lang="ru-RU" smtClean="0"/>
+              <a:rPr lang="ru-RU"/>
               <a:t>Четвертый уровень</a:t>
             </a:r>
           </a:p>
           <a:p>
             <a:pPr lvl="4"/>
             <a:r>
-              <a:rPr lang="ru-RU" smtClean="0"/>
+              <a:rPr lang="ru-RU"/>
               <a:t>Пятый уровень</a:t>
             </a:r>
-            <a:endParaRPr lang="ru-RU"/>
           </a:p>
         </p:txBody>
       </p:sp>
@@ -2642,7 +2614,7 @@
           <a:p>
             <a:pPr lvl="0"/>
             <a:r>
-              <a:rPr lang="ru-RU" smtClean="0"/>
+              <a:rPr lang="ru-RU"/>
               <a:t>Образец текста</a:t>
             </a:r>
           </a:p>
@@ -2665,7 +2637,7 @@
           <a:p>
             <a:fld id="{91D1034F-4441-48A1-BDC0-25EA1022324A}" type="datetime1">
               <a:rPr lang="ru-RU" smtClean="0"/>
-              <a:t>12.09.2024</a:t>
+              <a:t>16.04.2025</a:t>
             </a:fld>
             <a:endParaRPr lang="ru-RU"/>
           </a:p>
@@ -2687,10 +2659,9 @@
           <a:lstStyle/>
           <a:p>
             <a:r>
-              <a:rPr lang="ru-RU" smtClean="0"/>
+              <a:rPr lang="ru-RU"/>
               <a:t>Артём Макаров</a:t>
             </a:r>
-            <a:endParaRPr lang="ru-RU"/>
           </a:p>
         </p:txBody>
       </p:sp>
@@ -2772,10 +2743,9 @@
           </a:lstStyle>
           <a:p>
             <a:r>
-              <a:rPr lang="ru-RU" smtClean="0"/>
+              <a:rPr lang="ru-RU"/>
               <a:t>Образец заголовка</a:t>
             </a:r>
-            <a:endParaRPr lang="ru-RU"/>
           </a:p>
         </p:txBody>
       </p:sp>
@@ -2899,7 +2869,7 @@
           <a:p>
             <a:pPr lvl="0"/>
             <a:r>
-              <a:rPr lang="ru-RU" smtClean="0"/>
+              <a:rPr lang="ru-RU"/>
               <a:t>Образец текста</a:t>
             </a:r>
           </a:p>
@@ -2922,7 +2892,7 @@
           <a:p>
             <a:fld id="{B0FFDE79-B627-473B-AE17-4C65BD2495F7}" type="datetime1">
               <a:rPr lang="ru-RU" smtClean="0"/>
-              <a:t>12.09.2024</a:t>
+              <a:t>16.04.2025</a:t>
             </a:fld>
             <a:endParaRPr lang="ru-RU"/>
           </a:p>
@@ -2944,10 +2914,9 @@
           <a:lstStyle/>
           <a:p>
             <a:r>
-              <a:rPr lang="ru-RU" smtClean="0"/>
+              <a:rPr lang="ru-RU"/>
               <a:t>Артём Макаров</a:t>
             </a:r>
-            <a:endParaRPr lang="ru-RU"/>
           </a:p>
         </p:txBody>
       </p:sp>
@@ -3035,10 +3004,9 @@
           <a:lstStyle/>
           <a:p>
             <a:r>
-              <a:rPr lang="ru-RU" dirty="0" smtClean="0"/>
+              <a:rPr lang="ru-RU" dirty="0"/>
               <a:t>Образец заголовка</a:t>
             </a:r>
-            <a:endParaRPr lang="ru-RU" dirty="0"/>
           </a:p>
         </p:txBody>
       </p:sp>
@@ -3069,38 +3037,37 @@
           <a:p>
             <a:pPr lvl="0"/>
             <a:r>
-              <a:rPr lang="ru-RU" dirty="0" smtClean="0"/>
+              <a:rPr lang="ru-RU" dirty="0"/>
               <a:t>Образец текста</a:t>
             </a:r>
           </a:p>
           <a:p>
             <a:pPr lvl="1"/>
             <a:r>
-              <a:rPr lang="ru-RU" dirty="0" smtClean="0"/>
+              <a:rPr lang="ru-RU" dirty="0"/>
               <a:t>Второй уровень</a:t>
             </a:r>
           </a:p>
           <a:p>
             <a:pPr lvl="2"/>
             <a:r>
-              <a:rPr lang="ru-RU" dirty="0" smtClean="0"/>
+              <a:rPr lang="ru-RU" dirty="0"/>
               <a:t>Третий уровень</a:t>
             </a:r>
           </a:p>
           <a:p>
             <a:pPr lvl="3"/>
             <a:r>
-              <a:rPr lang="ru-RU" dirty="0" smtClean="0"/>
+              <a:rPr lang="ru-RU" dirty="0"/>
               <a:t>Четвертый уровень</a:t>
             </a:r>
           </a:p>
           <a:p>
             <a:pPr lvl="4"/>
             <a:r>
-              <a:rPr lang="ru-RU" dirty="0" smtClean="0"/>
+              <a:rPr lang="ru-RU" dirty="0"/>
               <a:t>Пятый уровень</a:t>
             </a:r>
-            <a:endParaRPr lang="ru-RU" dirty="0"/>
           </a:p>
         </p:txBody>
       </p:sp>
@@ -3139,7 +3106,7 @@
           <a:p>
             <a:fld id="{11CA537A-1B8C-47BA-9BA6-7CE3FAFDA8BE}" type="datetime1">
               <a:rPr lang="ru-RU" smtClean="0"/>
-              <a:t>12.09.2024</a:t>
+              <a:t>16.04.2025</a:t>
             </a:fld>
             <a:endParaRPr lang="ru-RU"/>
           </a:p>
@@ -3179,10 +3146,9 @@
           </a:lstStyle>
           <a:p>
             <a:r>
-              <a:rPr lang="ru-RU" smtClean="0"/>
+              <a:rPr lang="ru-RU"/>
               <a:t>Артём Макаров</a:t>
             </a:r>
-            <a:endParaRPr lang="ru-RU"/>
           </a:p>
         </p:txBody>
       </p:sp>
@@ -3571,22 +3537,17 @@
           </a:bodyPr>
           <a:lstStyle/>
           <a:p>
-            <a:r>
-              <a:rPr lang="en-US" dirty="0" smtClean="0"/>
-              <a:t/>
-            </a:r>
             <a:br>
-              <a:rPr lang="en-US" dirty="0" smtClean="0"/>
+              <a:rPr lang="en-US" dirty="0"/>
             </a:br>
             <a:r>
-              <a:rPr lang="en-US" dirty="0" smtClean="0"/>
+              <a:rPr lang="en-US" dirty="0"/>
               <a:t> </a:t>
             </a:r>
             <a:r>
-              <a:rPr lang="ru-RU" dirty="0" smtClean="0"/>
+              <a:rPr lang="ru-RU" dirty="0"/>
               <a:t>Аутентифицированное шифрование</a:t>
             </a:r>
-            <a:endParaRPr lang="ru-RU" dirty="0"/>
           </a:p>
         </p:txBody>
       </p:sp>
@@ -3611,20 +3572,23 @@
           <a:lstStyle/>
           <a:p>
             <a:r>
-              <a:rPr lang="ru-RU" dirty="0" smtClean="0"/>
+              <a:rPr lang="ru-RU" dirty="0"/>
               <a:t>Макаров Артём </a:t>
             </a:r>
           </a:p>
           <a:p>
             <a:r>
-              <a:rPr lang="ru-RU" dirty="0" smtClean="0"/>
+              <a:rPr lang="ru-RU" dirty="0"/>
               <a:t>МИФИ </a:t>
             </a:r>
             <a:r>
-              <a:rPr lang="en-US" smtClean="0"/>
-              <a:t>2023</a:t>
-            </a:r>
-            <a:endParaRPr lang="ru-RU" dirty="0"/>
+              <a:rPr lang="en-US" dirty="0"/>
+              <a:t>202</a:t>
+            </a:r>
+            <a:r>
+              <a:rPr lang="ru-RU" dirty="0"/>
+              <a:t>5</a:t>
+            </a:r>
           </a:p>
         </p:txBody>
       </p:sp>
@@ -3638,13 +3602,6 @@
   <p:clrMapOvr>
     <a:masterClrMapping/>
   </p:clrMapOvr>
-  <p:timing>
-    <p:tnLst>
-      <p:par>
-        <p:cTn id="1" dur="indefinite" restart="never" nodeType="tmRoot"/>
-      </p:par>
-    </p:tnLst>
-  </p:timing>
 </p:sld>
 </file>
 
@@ -3681,10 +3638,9 @@
           <a:lstStyle/>
           <a:p>
             <a:r>
-              <a:rPr lang="ru-RU" dirty="0" smtClean="0"/>
+              <a:rPr lang="ru-RU" dirty="0"/>
               <a:t>Аутентифицированное шифрование</a:t>
             </a:r>
-            <a:endParaRPr lang="ru-RU" dirty="0"/>
           </a:p>
         </p:txBody>
       </p:sp>
@@ -3718,18 +3674,17 @@
           </a:p>
           <a:p>
             <a:r>
-              <a:rPr lang="ru-RU" b="1" dirty="0" smtClean="0"/>
+              <a:rPr lang="ru-RU" b="1" dirty="0"/>
               <a:t>Стойкое шифрование</a:t>
             </a:r>
             <a:r>
-              <a:rPr lang="ru-RU" b="1" smtClean="0"/>
+              <a:rPr lang="ru-RU" b="1"/>
               <a:t>, против </a:t>
             </a:r>
             <a:r>
-              <a:rPr lang="ru-RU" b="1" dirty="0" smtClean="0"/>
+              <a:rPr lang="ru-RU" b="1" dirty="0"/>
               <a:t>пассивных противников</a:t>
             </a:r>
-            <a:endParaRPr lang="ru-RU" b="1" dirty="0"/>
           </a:p>
           <a:p>
             <a:r>
@@ -3737,28 +3692,24 @@
               <a:t>Целостность </a:t>
             </a:r>
             <a:r>
-              <a:rPr lang="ru-RU" b="1" dirty="0" err="1" smtClean="0"/>
+              <a:rPr lang="ru-RU" b="1" dirty="0" err="1"/>
               <a:t>шифртекстов</a:t>
             </a:r>
             <a:r>
-              <a:rPr lang="ru-RU" b="1" dirty="0" smtClean="0"/>
+              <a:rPr lang="ru-RU" b="1" dirty="0"/>
               <a:t> </a:t>
             </a:r>
             <a:r>
-              <a:rPr lang="ru-RU" dirty="0" smtClean="0"/>
+              <a:rPr lang="ru-RU" dirty="0"/>
               <a:t>(</a:t>
             </a:r>
             <a:r>
-              <a:rPr lang="en-US" dirty="0" smtClean="0"/>
+              <a:rPr lang="en-US" dirty="0"/>
               <a:t>CI)</a:t>
             </a:r>
             <a:r>
-              <a:rPr lang="ru-RU" dirty="0" smtClean="0"/>
-              <a:t> </a:t>
-            </a:r>
-            <a:r>
               <a:rPr lang="ru-RU" dirty="0"/>
-              <a:t>(противник не может получить корректный </a:t>
+              <a:t> (противник не может получить корректный </a:t>
             </a:r>
             <a:r>
               <a:rPr lang="ru-RU" dirty="0" err="1"/>
@@ -3843,10 +3794,9 @@
           <a:lstStyle/>
           <a:p>
             <a:r>
-              <a:rPr lang="ru-RU" dirty="0" smtClean="0"/>
+              <a:rPr lang="ru-RU" dirty="0"/>
               <a:t>Следствия аутентифицированного шифрования</a:t>
             </a:r>
-            <a:endParaRPr lang="ru-RU" dirty="0"/>
           </a:p>
         </p:txBody>
       </p:sp>
@@ -3873,28 +3823,28 @@
           <a:lstStyle/>
           <a:p>
             <a:r>
-              <a:rPr lang="ru-RU" dirty="0" smtClean="0"/>
+              <a:rPr lang="ru-RU" dirty="0"/>
               <a:t>Пассивный противник не может расшифровать сообщения</a:t>
             </a:r>
           </a:p>
           <a:p>
             <a:r>
-              <a:rPr lang="ru-RU" dirty="0" smtClean="0"/>
+              <a:rPr lang="ru-RU" dirty="0"/>
               <a:t>Активный противник не может вставлять или изменять сообщения в канале</a:t>
             </a:r>
-            <a:endParaRPr lang="en-US" dirty="0" smtClean="0"/>
-          </a:p>
-          <a:p>
-            <a:r>
-              <a:rPr lang="ru-RU" dirty="0" smtClean="0"/>
+            <a:endParaRPr lang="en-US" dirty="0"/>
+          </a:p>
+          <a:p>
+            <a:r>
+              <a:rPr lang="ru-RU" dirty="0"/>
               <a:t>Целостность </a:t>
             </a:r>
             <a:r>
-              <a:rPr lang="ru-RU" dirty="0" err="1" smtClean="0"/>
+              <a:rPr lang="ru-RU" dirty="0" err="1"/>
               <a:t>шифртекстов</a:t>
             </a:r>
             <a:r>
-              <a:rPr lang="ru-RU" dirty="0" smtClean="0"/>
+              <a:rPr lang="ru-RU" dirty="0"/>
               <a:t> обеспечивает целостность открытых текстов</a:t>
             </a:r>
           </a:p>
@@ -3993,10 +3943,9 @@
           <a:p>
             <a:pPr algn="ctr"/>
             <a:r>
-              <a:rPr lang="en-US" sz="2400" dirty="0" smtClean="0"/>
+              <a:rPr lang="en-US" sz="2400" dirty="0"/>
               <a:t>Alice</a:t>
             </a:r>
-            <a:endParaRPr lang="en-US" sz="2400" dirty="0"/>
           </a:p>
         </p:txBody>
       </p:sp>
@@ -4035,10 +3984,9 @@
           <a:p>
             <a:pPr algn="ctr"/>
             <a:r>
-              <a:rPr lang="en-US" sz="2400" dirty="0" smtClean="0"/>
+              <a:rPr lang="en-US" sz="2400" dirty="0"/>
               <a:t>Bob</a:t>
             </a:r>
-            <a:endParaRPr lang="en-US" sz="2400" dirty="0"/>
           </a:p>
         </p:txBody>
       </p:sp>
@@ -4065,18 +4013,13 @@
           <a:lstStyle/>
           <a:p>
             <a:r>
-              <a:rPr lang="en-US" sz="2400" b="1" i="1" dirty="0" smtClean="0">
+              <a:rPr lang="en-US" sz="2400" b="1" i="1" dirty="0">
                 <a:solidFill>
                   <a:srgbClr val="FF0000"/>
                 </a:solidFill>
               </a:rPr>
               <a:t>k</a:t>
             </a:r>
-            <a:endParaRPr lang="en-US" sz="2400" b="1" i="1" dirty="0">
-              <a:solidFill>
-                <a:srgbClr val="FF0000"/>
-              </a:solidFill>
-            </a:endParaRPr>
           </a:p>
         </p:txBody>
       </p:sp>
@@ -4103,18 +4046,13 @@
           <a:lstStyle/>
           <a:p>
             <a:r>
-              <a:rPr lang="en-US" sz="2400" b="1" i="1" dirty="0" smtClean="0">
+              <a:rPr lang="en-US" sz="2400" b="1" i="1" dirty="0">
                 <a:solidFill>
                   <a:srgbClr val="FF0000"/>
                 </a:solidFill>
               </a:rPr>
               <a:t>k</a:t>
             </a:r>
-            <a:endParaRPr lang="en-US" sz="2400" b="1" i="1" dirty="0">
-              <a:solidFill>
-                <a:srgbClr val="FF0000"/>
-              </a:solidFill>
-            </a:endParaRPr>
           </a:p>
         </p:txBody>
       </p:sp>
@@ -4254,10 +4192,9 @@
             <a:lstStyle/>
             <a:p>
               <a:r>
-                <a:rPr lang="en-US" sz="2400" i="1" dirty="0" smtClean="0"/>
+                <a:rPr lang="en-US" sz="2400" i="1" dirty="0"/>
                 <a:t>c</a:t>
               </a:r>
-              <a:endParaRPr lang="en-US" sz="2400" i="1" dirty="0"/>
             </a:p>
           </p:txBody>
         </p:sp>
@@ -4302,76 +4239,72 @@
                 <a:p>
                   <a:pPr algn="ctr"/>
                   <a:r>
-                    <a:rPr lang="ru-RU" sz="2400" dirty="0" smtClean="0"/>
+                    <a:rPr lang="ru-RU" sz="2400" dirty="0"/>
                     <a:t>Не может создать</a:t>
                   </a:r>
                   <a:r>
-                    <a:rPr lang="en-US" sz="2400" dirty="0" smtClean="0"/>
+                    <a:rPr lang="en-US" sz="2400" dirty="0"/>
                     <a:t> </a:t>
                   </a:r>
                   <a:r>
-                    <a:rPr lang="ru-RU" sz="2400" dirty="0" smtClean="0"/>
+                    <a:rPr lang="ru-RU" sz="2400" dirty="0"/>
                     <a:t>корректный</a:t>
                   </a:r>
-                  <a:r>
-                    <a:rPr lang="en-US" sz="2400" dirty="0" smtClean="0"/>
-                    <a:t/>
-                  </a:r>
                   <a:br>
-                    <a:rPr lang="en-US" sz="2400" dirty="0" smtClean="0"/>
+                    <a:rPr lang="en-US" sz="2400" dirty="0"/>
                   </a:br>
                   <a:r>
-                    <a:rPr lang="en-US" sz="2400" i="1" dirty="0" smtClean="0"/>
+                    <a:rPr lang="en-US" sz="2400" i="1" dirty="0"/>
                     <a:t>c</a:t>
                   </a:r>
                   <a:r>
-                    <a:rPr lang="en-US" sz="2400" dirty="0" smtClean="0"/>
+                    <a:rPr lang="en-US" sz="2400" dirty="0"/>
                     <a:t> ∉ { </a:t>
                   </a:r>
                   <a:r>
-                    <a:rPr lang="en-US" sz="2400" i="1" dirty="0" smtClean="0"/>
+                    <a:rPr lang="en-US" sz="2400" i="1" dirty="0"/>
                     <a:t>c</a:t>
                   </a:r>
                   <a:r>
-                    <a:rPr lang="en-US" sz="2400" baseline="-25000" dirty="0" smtClean="0"/>
+                    <a:rPr lang="en-US" sz="2400" baseline="-25000" dirty="0"/>
                     <a:t>1</a:t>
                   </a:r>
                   <a:r>
-                    <a:rPr lang="en-US" sz="2400" dirty="0" smtClean="0"/>
+                    <a:rPr lang="en-US" sz="2400" dirty="0"/>
                     <a:t>, …, </a:t>
                   </a:r>
                   <a:r>
-                    <a:rPr lang="en-US" sz="2400" i="1" dirty="0" err="1" smtClean="0"/>
+                    <a:rPr lang="en-US" sz="2400" i="1" dirty="0" err="1"/>
                     <a:t>c</a:t>
                   </a:r>
                   <a:r>
-                    <a:rPr lang="en-US" sz="2400" i="1" baseline="-25000" dirty="0" err="1" smtClean="0"/>
+                    <a:rPr lang="en-US" sz="2400" i="1" baseline="-25000" dirty="0" err="1"/>
                     <a:t>q</a:t>
                   </a:r>
                   <a:r>
-                    <a:rPr lang="en-US" sz="2400" dirty="0" smtClean="0"/>
+                    <a:rPr lang="en-US" sz="2400" dirty="0"/>
                     <a:t>}</a:t>
                   </a:r>
                 </a:p>
                 <a:p>
                   <a:pPr algn="ctr"/>
                   <a:r>
-                    <a:rPr lang="ru-RU" sz="2400" dirty="0" smtClean="0"/>
+                    <a:rPr lang="ru-RU" sz="2400" dirty="0"/>
                     <a:t>Не может различить</a:t>
                   </a:r>
                 </a:p>
                 <a:p>
                   <a:pPr algn="ctr"/>
                   <a:r>
-                    <a:rPr lang="ru-RU" sz="2400" dirty="0" smtClean="0"/>
+                    <a:rPr lang="ru-RU" sz="2400" dirty="0"/>
                     <a:t> </a:t>
                   </a:r>
                   <a:r>
-                    <a:rPr lang="ru-RU" sz="2400" dirty="0" err="1" smtClean="0"/>
+                    <a:rPr lang="ru-RU" sz="2400" dirty="0" err="1"/>
                     <a:t>зашифрования</a:t>
                   </a:r>
                   <a:r>
-                    <a:rPr lang="ru-RU" sz="2400" dirty="0" smtClean="0"/>
+                    <a:rPr lang="ru-RU" sz="2400" dirty="0"/>
                     <a:t> </a:t>
                   </a:r>
                   <a14:m>
@@ -4446,15 +4379,15 @@
                       </m:sSub>
                     </m:oMath>
                   </a14:m>
-                  <a:endParaRPr lang="en-US" sz="2400" dirty="0" smtClean="0"/>
+                  <a:endParaRPr lang="en-US" sz="2400" dirty="0"/>
                 </a:p>
                 <a:p>
                   <a:pPr algn="ctr"/>
                   <a:r>
-                    <a:rPr lang="ru-RU" sz="2400" dirty="0" smtClean="0"/>
+                    <a:rPr lang="ru-RU" sz="2400" dirty="0"/>
                     <a:t>Не может расшифровать</a:t>
                   </a:r>
-                  <a:endParaRPr lang="en-US" sz="2400" dirty="0" smtClean="0"/>
+                  <a:endParaRPr lang="en-US" sz="2400" dirty="0"/>
                 </a:p>
                 <a:p>
                   <a:pPr algn="ctr"/>
@@ -4488,7 +4421,7 @@
                     </m:oMath>
                   </a14:m>
                   <a:r>
-                    <a:rPr lang="ru-RU" sz="2400" dirty="0" smtClean="0"/>
+                    <a:rPr lang="ru-RU" sz="2400" dirty="0"/>
                     <a:t> </a:t>
                   </a:r>
                   <a:endParaRPr lang="en-US" sz="2400" dirty="0"/>
@@ -4851,7 +4784,7 @@
                     </m:oMath>
                   </m:oMathPara>
                 </a14:m>
-                <a:endParaRPr lang="en-US" sz="2400" b="0" dirty="0" smtClean="0"/>
+                <a:endParaRPr lang="en-US" sz="2400" b="0" dirty="0"/>
               </a:p>
             </p:txBody>
           </p:sp>
@@ -4905,13 +4838,6 @@
   <p:clrMapOvr>
     <a:masterClrMapping/>
   </p:clrMapOvr>
-  <p:timing>
-    <p:tnLst>
-      <p:par>
-        <p:cTn id="1" dur="indefinite" restart="never" nodeType="tmRoot"/>
-      </p:par>
-    </p:tnLst>
-  </p:timing>
 </p:sld>
 </file>
 
@@ -4948,10 +4874,9 @@
           <a:lstStyle/>
           <a:p>
             <a:r>
-              <a:rPr lang="ru-RU" dirty="0" smtClean="0"/>
+              <a:rPr lang="ru-RU" dirty="0"/>
               <a:t>Аутентифицированное шифрование</a:t>
             </a:r>
-            <a:endParaRPr lang="ru-RU" dirty="0"/>
           </a:p>
         </p:txBody>
       </p:sp>
@@ -4971,65 +4896,64 @@
           <a:lstStyle/>
           <a:p>
             <a:r>
-              <a:rPr lang="ru-RU" dirty="0" smtClean="0"/>
+              <a:rPr lang="ru-RU" dirty="0"/>
               <a:t>Использует модель стойкого шифрования</a:t>
             </a:r>
             <a:r>
-              <a:rPr lang="en-US" dirty="0" smtClean="0"/>
+              <a:rPr lang="en-US" dirty="0"/>
               <a:t> + CI</a:t>
             </a:r>
-            <a:endParaRPr lang="ru-RU" dirty="0" smtClean="0"/>
-          </a:p>
-          <a:p>
-            <a:r>
-              <a:rPr lang="ru-RU" dirty="0" smtClean="0"/>
+            <a:endParaRPr lang="ru-RU" dirty="0"/>
+          </a:p>
+          <a:p>
+            <a:r>
+              <a:rPr lang="ru-RU" dirty="0"/>
               <a:t>Обеспечивает целостность сообщений и </a:t>
             </a:r>
             <a:r>
-              <a:rPr lang="ru-RU" dirty="0" err="1" smtClean="0"/>
+              <a:rPr lang="ru-RU" dirty="0" err="1"/>
               <a:t>шифртекстов</a:t>
             </a:r>
-            <a:endParaRPr lang="ru-RU" dirty="0" smtClean="0"/>
-          </a:p>
-          <a:p>
-            <a:r>
-              <a:rPr lang="ru-RU" dirty="0" smtClean="0"/>
+            <a:endParaRPr lang="ru-RU" dirty="0"/>
+          </a:p>
+          <a:p>
+            <a:r>
+              <a:rPr lang="ru-RU" dirty="0"/>
               <a:t>Обеспечивает конфиденциальность</a:t>
             </a:r>
           </a:p>
           <a:p>
             <a:r>
-              <a:rPr lang="ru-RU" dirty="0" smtClean="0"/>
+              <a:rPr lang="ru-RU" dirty="0"/>
               <a:t>Защита от активных противников</a:t>
             </a:r>
           </a:p>
           <a:p>
             <a:r>
-              <a:rPr lang="ru-RU" dirty="0" smtClean="0"/>
+              <a:rPr lang="ru-RU" dirty="0"/>
               <a:t>В общем случае не защищает от атак повтором (повторная пересылка пакетов)</a:t>
             </a:r>
           </a:p>
           <a:p>
             <a:pPr lvl="1"/>
             <a:r>
-              <a:rPr lang="ru-RU" dirty="0" smtClean="0"/>
+              <a:rPr lang="ru-RU" dirty="0"/>
               <a:t>Можно решить введя специальный формат сообщений, включающих счётчики или идентификаторы</a:t>
             </a:r>
-            <a:endParaRPr lang="en-US" dirty="0" smtClean="0"/>
+            <a:endParaRPr lang="en-US" dirty="0"/>
           </a:p>
           <a:p>
             <a:pPr lvl="1"/>
             <a:r>
-              <a:rPr lang="ru-RU" dirty="0" smtClean="0"/>
+              <a:rPr lang="ru-RU" dirty="0"/>
               <a:t>Вообще говоря это задача протоколов, а не конструкций (примитивов)</a:t>
             </a:r>
           </a:p>
           <a:p>
             <a:r>
-              <a:rPr lang="ru-RU" dirty="0" smtClean="0"/>
+              <a:rPr lang="ru-RU" dirty="0"/>
               <a:t>Возможны атаки по побочным каналам (например, атаки по времени)</a:t>
             </a:r>
-            <a:endParaRPr lang="ru-RU" dirty="0"/>
           </a:p>
         </p:txBody>
       </p:sp>
@@ -5066,13 +4990,6 @@
   <p:clrMapOvr>
     <a:masterClrMapping/>
   </p:clrMapOvr>
-  <p:timing>
-    <p:tnLst>
-      <p:par>
-        <p:cTn id="1" dur="indefinite" restart="never" nodeType="tmRoot"/>
-      </p:par>
-    </p:tnLst>
-  </p:timing>
 </p:sld>
 </file>
 
@@ -5153,7 +5070,7 @@
           <a:p>
             <a:pPr algn="ctr" eaLnBrk="1" hangingPunct="1"/>
             <a:r>
-              <a:rPr lang="en-US" dirty="0" smtClean="0"/>
+              <a:rPr lang="en-US" dirty="0"/>
               <a:t>Combining MAC and ENC</a:t>
             </a:r>
           </a:p>
@@ -6685,7 +6602,7 @@
                   <a:buNone/>
                 </a:pPr>
                 <a:r>
-                  <a:rPr lang="ru-RU" dirty="0" smtClean="0"/>
+                  <a:rPr lang="ru-RU" dirty="0"/>
                   <a:t>Пусть </a:t>
                 </a:r>
                 <a14:m>
@@ -6732,11 +6649,11 @@
                   </m:oMath>
                 </a14:m>
                 <a:r>
-                  <a:rPr lang="en-US" dirty="0" smtClean="0"/>
+                  <a:rPr lang="en-US" dirty="0"/>
                   <a:t> </a:t>
                 </a:r>
                 <a:r>
-                  <a:rPr lang="ru-RU" dirty="0" smtClean="0"/>
+                  <a:rPr lang="ru-RU" dirty="0"/>
                   <a:t>шифр на </a:t>
                 </a:r>
                 <a14:m>
@@ -6805,7 +6722,7 @@
                   </m:oMath>
                 </a14:m>
                 <a:r>
-                  <a:rPr lang="en-US" dirty="0" smtClean="0"/>
+                  <a:rPr lang="en-US" dirty="0"/>
                   <a:t>, </a:t>
                 </a:r>
                 <a14:m>
@@ -6849,11 +6766,11 @@
                   </m:oMath>
                 </a14:m>
                 <a:r>
-                  <a:rPr lang="en-US" dirty="0" smtClean="0"/>
+                  <a:rPr lang="en-US" dirty="0"/>
                   <a:t> – MAC </a:t>
                 </a:r>
                 <a:r>
-                  <a:rPr lang="ru-RU" dirty="0" smtClean="0"/>
+                  <a:rPr lang="ru-RU" dirty="0"/>
                   <a:t>на </a:t>
                 </a:r>
                 <a14:m>
@@ -6922,7 +6839,7 @@
                   </m:oMath>
                 </a14:m>
                 <a:r>
-                  <a:rPr lang="ru-RU" dirty="0" smtClean="0"/>
+                  <a:rPr lang="ru-RU" dirty="0"/>
                   <a:t>.</a:t>
                 </a:r>
               </a:p>
@@ -7036,11 +6953,11 @@
                   </m:oMath>
                 </a14:m>
                 <a:r>
-                  <a:rPr lang="en-US" dirty="0" smtClean="0"/>
+                  <a:rPr lang="en-US" dirty="0"/>
                   <a:t> </a:t>
                 </a:r>
                 <a:r>
-                  <a:rPr lang="ru-RU" dirty="0" smtClean="0"/>
+                  <a:rPr lang="ru-RU" dirty="0"/>
                   <a:t>на </a:t>
                 </a:r>
                 <a14:m>
@@ -7152,7 +7069,7 @@
                   </m:oMath>
                 </a14:m>
                 <a:r>
-                  <a:rPr lang="en-US" dirty="0" smtClean="0"/>
+                  <a:rPr lang="en-US" dirty="0"/>
                   <a:t>:</a:t>
                 </a:r>
               </a:p>
@@ -7484,7 +7401,7 @@
                     </m:r>
                   </m:oMath>
                 </a14:m>
-                <a:endParaRPr lang="en-US" dirty="0" smtClean="0"/>
+                <a:endParaRPr lang="en-US" dirty="0"/>
               </a:p>
               <a:p>
                 <a14:m>
@@ -7790,7 +7707,7 @@
                     </m:r>
                   </m:oMath>
                 </a14:m>
-                <a:endParaRPr lang="en-US" b="0" dirty="0" smtClean="0"/>
+                <a:endParaRPr lang="en-US" b="0" dirty="0"/>
               </a:p>
               <a:p>
                 <a:pPr marL="0" indent="0">
@@ -7892,13 +7809,6 @@
   <p:clrMapOvr>
     <a:masterClrMapping/>
   </p:clrMapOvr>
-  <p:timing>
-    <p:tnLst>
-      <p:par>
-        <p:cTn id="1" dur="indefinite" restart="never" nodeType="tmRoot"/>
-      </p:par>
-    </p:tnLst>
-  </p:timing>
 </p:sld>
 </file>
 
@@ -7964,100 +7874,99 @@
           </a:bodyPr>
           <a:lstStyle/>
           <a:p>
-            <a:endParaRPr lang="ru-RU" dirty="0" smtClean="0"/>
-          </a:p>
-          <a:p>
-            <a:r>
-              <a:rPr lang="ru-RU" dirty="0" smtClean="0"/>
+            <a:endParaRPr lang="ru-RU" dirty="0"/>
+          </a:p>
+          <a:p>
+            <a:r>
+              <a:rPr lang="ru-RU" dirty="0"/>
               <a:t>Необходимо использование </a:t>
             </a:r>
             <a:r>
-              <a:rPr lang="ru-RU" b="1" dirty="0" smtClean="0"/>
+              <a:rPr lang="ru-RU" b="1" dirty="0"/>
               <a:t>различных, независимых ключей</a:t>
             </a:r>
             <a:r>
-              <a:rPr lang="ru-RU" dirty="0" smtClean="0"/>
+              <a:rPr lang="ru-RU" dirty="0"/>
               <a:t> для </a:t>
             </a:r>
             <a:r>
-              <a:rPr lang="en-US" dirty="0" smtClean="0"/>
+              <a:rPr lang="en-US" dirty="0"/>
               <a:t>MAC </a:t>
             </a:r>
             <a:r>
-              <a:rPr lang="ru-RU" dirty="0" smtClean="0"/>
+              <a:rPr lang="ru-RU" dirty="0"/>
               <a:t>и шифрования (использование одинаковых ключей может вести к реальным атакам, например при использовании </a:t>
             </a:r>
             <a:r>
-              <a:rPr lang="en-US" dirty="0" smtClean="0"/>
+              <a:rPr lang="en-US" dirty="0"/>
               <a:t>CBC </a:t>
             </a:r>
             <a:r>
-              <a:rPr lang="ru-RU" dirty="0" smtClean="0"/>
+              <a:rPr lang="ru-RU" dirty="0"/>
               <a:t>шифрования и </a:t>
             </a:r>
             <a:r>
-              <a:rPr lang="en-US" dirty="0" smtClean="0"/>
+              <a:rPr lang="en-US" dirty="0"/>
               <a:t>CBC MAC)</a:t>
             </a:r>
-            <a:endParaRPr lang="ru-RU" dirty="0" smtClean="0"/>
-          </a:p>
-          <a:p>
-            <a:r>
-              <a:rPr lang="en-US" dirty="0" smtClean="0"/>
+            <a:endParaRPr lang="ru-RU" dirty="0"/>
+          </a:p>
+          <a:p>
+            <a:r>
+              <a:rPr lang="en-US" dirty="0"/>
               <a:t>MAC </a:t>
             </a:r>
             <a:r>
-              <a:rPr lang="ru-RU" dirty="0" smtClean="0"/>
+              <a:rPr lang="ru-RU" dirty="0"/>
               <a:t>должны вычисляться для </a:t>
             </a:r>
             <a:r>
-              <a:rPr lang="ru-RU" b="1" dirty="0" smtClean="0"/>
+              <a:rPr lang="ru-RU" b="1" dirty="0"/>
               <a:t>всего</a:t>
             </a:r>
             <a:r>
-              <a:rPr lang="ru-RU" dirty="0" smtClean="0"/>
+              <a:rPr lang="ru-RU" dirty="0"/>
               <a:t> </a:t>
             </a:r>
             <a:r>
-              <a:rPr lang="ru-RU" dirty="0" err="1" smtClean="0"/>
+              <a:rPr lang="ru-RU" dirty="0" err="1"/>
               <a:t>шифртекста</a:t>
             </a:r>
             <a:r>
-              <a:rPr lang="ru-RU" dirty="0" smtClean="0"/>
+              <a:rPr lang="ru-RU" dirty="0"/>
               <a:t> (</a:t>
             </a:r>
             <a:r>
-              <a:rPr lang="ru-RU" b="1" dirty="0" smtClean="0"/>
+              <a:rPr lang="ru-RU" b="1" dirty="0"/>
               <a:t>включая</a:t>
             </a:r>
             <a:r>
-              <a:rPr lang="ru-RU" dirty="0" smtClean="0"/>
+              <a:rPr lang="ru-RU" dirty="0"/>
               <a:t> </a:t>
             </a:r>
             <a:r>
-              <a:rPr lang="en-US" dirty="0" smtClean="0"/>
+              <a:rPr lang="en-US" dirty="0"/>
               <a:t>IV)</a:t>
             </a:r>
+          </a:p>
+          <a:p>
+            <a:r>
+              <a:rPr lang="ru-RU" dirty="0"/>
+              <a:t>Проверка целостности осуществляется </a:t>
+            </a:r>
+            <a:r>
+              <a:rPr lang="ru-RU" b="1" dirty="0"/>
+              <a:t>строго до</a:t>
+            </a:r>
+            <a:r>
+              <a:rPr lang="ru-RU" dirty="0"/>
+              <a:t> </a:t>
+            </a:r>
+            <a:r>
+              <a:rPr lang="ru-RU" dirty="0" err="1"/>
+              <a:t>расшифрования</a:t>
+            </a:r>
             <a:endParaRPr lang="en-US" dirty="0"/>
-          </a:p>
-          <a:p>
-            <a:r>
-              <a:rPr lang="ru-RU" dirty="0" smtClean="0"/>
-              <a:t>Проверка целостности осуществляется </a:t>
-            </a:r>
-            <a:r>
-              <a:rPr lang="ru-RU" b="1" dirty="0" smtClean="0"/>
-              <a:t>строго до</a:t>
-            </a:r>
-            <a:r>
-              <a:rPr lang="ru-RU" dirty="0" smtClean="0"/>
-              <a:t> </a:t>
-            </a:r>
-            <a:r>
-              <a:rPr lang="ru-RU" dirty="0" err="1" smtClean="0"/>
-              <a:t>расшифрования</a:t>
-            </a:r>
-            <a:endParaRPr lang="en-US" dirty="0" smtClean="0"/>
           </a:p>
           <a:p>
             <a:pPr marL="0" indent="0">
@@ -8100,13 +8009,6 @@
   <p:clrMapOvr>
     <a:masterClrMapping/>
   </p:clrMapOvr>
-  <p:timing>
-    <p:tnLst>
-      <p:par>
-        <p:cTn id="1" dur="indefinite" restart="never" nodeType="tmRoot"/>
-      </p:par>
-    </p:tnLst>
-  </p:timing>
 </p:sld>
 </file>
 
@@ -8143,7 +8045,7 @@
           <a:lstStyle/>
           <a:p>
             <a:r>
-              <a:rPr lang="en-US" dirty="0" smtClean="0"/>
+              <a:rPr lang="en-US" dirty="0"/>
               <a:t>MAC-then-encrypt</a:t>
             </a:r>
             <a:endParaRPr lang="ru-RU" dirty="0"/>
@@ -8173,7 +8075,7 @@
                   <a:buNone/>
                 </a:pPr>
                 <a:r>
-                  <a:rPr lang="ru-RU" dirty="0" smtClean="0"/>
+                  <a:rPr lang="ru-RU" dirty="0"/>
                   <a:t>Пусть </a:t>
                 </a:r>
                 <a14:m>
@@ -9189,7 +9091,7 @@
                     </m:r>
                   </m:oMath>
                 </a14:m>
-                <a:endParaRPr lang="en-US" b="0" i="1" dirty="0" smtClean="0">
+                <a:endParaRPr lang="en-US" b="0" i="1" dirty="0">
                   <a:latin typeface="Cambria Math" panose="02040503050406030204" pitchFamily="18" charset="0"/>
                 </a:endParaRPr>
               </a:p>
@@ -9338,13 +9240,13 @@
                     </m:oMath>
                   </m:oMathPara>
                 </a14:m>
-                <a:endParaRPr lang="en-US" dirty="0" smtClean="0"/>
+                <a:endParaRPr lang="en-US" dirty="0"/>
               </a:p>
               <a:p>
                 <a:pPr marL="0" indent="0">
                   <a:buNone/>
                 </a:pPr>
-                <a:endParaRPr lang="ru-RU" dirty="0" smtClean="0"/>
+                <a:endParaRPr lang="ru-RU" dirty="0"/>
               </a:p>
             </p:txBody>
           </p:sp>
@@ -9440,13 +9342,6 @@
   <p:clrMapOvr>
     <a:masterClrMapping/>
   </p:clrMapOvr>
-  <p:timing>
-    <p:tnLst>
-      <p:par>
-        <p:cTn id="1" dur="indefinite" restart="never" nodeType="tmRoot"/>
-      </p:par>
-    </p:tnLst>
-  </p:timing>
 </p:sld>
 </file>
 
@@ -9523,21 +9418,13 @@
             </a:r>
             <a:r>
               <a:rPr lang="ru-RU" dirty="0"/>
-              <a:t>и </a:t>
-            </a:r>
-            <a:r>
-              <a:rPr lang="ru-RU" dirty="0" smtClean="0"/>
-              <a:t>шифрования</a:t>
-            </a:r>
-          </a:p>
-          <a:p>
-            <a:r>
-              <a:rPr lang="ru-RU" b="1" dirty="0" smtClean="0"/>
-              <a:t>Не </a:t>
-            </a:r>
+              <a:t>и шифрования</a:t>
+            </a:r>
+          </a:p>
+          <a:p>
             <a:r>
               <a:rPr lang="ru-RU" b="1" dirty="0"/>
-              <a:t>является </a:t>
+              <a:t>Не является </a:t>
             </a:r>
             <a:r>
               <a:rPr lang="en-US" b="1" dirty="0"/>
@@ -9560,12 +9447,8 @@
               <a:t>, возможны атаки (сл. </a:t>
             </a:r>
             <a:r>
-              <a:rPr lang="en-US" dirty="0" smtClean="0"/>
-              <a:t>padding </a:t>
-            </a:r>
-            <a:r>
               <a:rPr lang="en-US" dirty="0"/>
-              <a:t>oracle</a:t>
+              <a:t>padding oracle</a:t>
             </a:r>
             <a:r>
               <a:rPr lang="ru-RU" dirty="0"/>
@@ -9578,28 +9461,16 @@
               <a:t>Является </a:t>
             </a:r>
             <a:r>
-              <a:rPr lang="en-US" dirty="0" smtClean="0"/>
+              <a:rPr lang="en-US" dirty="0"/>
               <a:t>AE </a:t>
             </a:r>
             <a:r>
-              <a:rPr lang="ru-RU" dirty="0" smtClean="0"/>
-              <a:t>стойким </a:t>
-            </a:r>
-            <a:r>
               <a:rPr lang="ru-RU" dirty="0"/>
-              <a:t>для </a:t>
+              <a:t>стойким для </a:t>
             </a:r>
             <a:r>
               <a:rPr lang="ru-RU" b="1" dirty="0"/>
-              <a:t>некоторых </a:t>
-            </a:r>
-            <a:r>
-              <a:rPr lang="ru-RU" b="1" dirty="0" smtClean="0"/>
-              <a:t>стойких </a:t>
-            </a:r>
-            <a:r>
-              <a:rPr lang="ru-RU" b="1" dirty="0"/>
-              <a:t>шифров </a:t>
+              <a:t>некоторых стойких шифров </a:t>
             </a:r>
             <a:r>
               <a:rPr lang="ru-RU" dirty="0"/>
@@ -9619,27 +9490,22 @@
             </a:r>
             <a:r>
               <a:rPr lang="ru-RU" dirty="0"/>
-              <a:t> без дополнения сообщений</a:t>
-            </a:r>
-            <a:r>
-              <a:rPr lang="ru-RU" dirty="0" smtClean="0"/>
-              <a:t>).</a:t>
-            </a:r>
-          </a:p>
-          <a:p>
-            <a:r>
-              <a:rPr lang="ru-RU" dirty="0" smtClean="0"/>
+              <a:t> без дополнения сообщений).</a:t>
+            </a:r>
+          </a:p>
+          <a:p>
+            <a:r>
+              <a:rPr lang="ru-RU" dirty="0"/>
               <a:t>Проверка аутентичности происходит после </a:t>
             </a:r>
             <a:r>
-              <a:rPr lang="ru-RU" dirty="0" err="1" smtClean="0"/>
+              <a:rPr lang="ru-RU" dirty="0" err="1"/>
               <a:t>расширования</a:t>
             </a:r>
             <a:r>
-              <a:rPr lang="ru-RU" dirty="0" smtClean="0"/>
+              <a:rPr lang="ru-RU" dirty="0"/>
               <a:t> (что и ведёт к ряду атак, в том числе по времени)</a:t>
             </a:r>
-            <a:endParaRPr lang="ru-RU" dirty="0"/>
           </a:p>
           <a:p>
             <a:endParaRPr lang="ru-RU" dirty="0"/>
@@ -9679,13 +9545,6 @@
   <p:clrMapOvr>
     <a:masterClrMapping/>
   </p:clrMapOvr>
-  <p:timing>
-    <p:tnLst>
-      <p:par>
-        <p:cTn id="1" dur="indefinite" restart="never" nodeType="tmRoot"/>
-      </p:par>
-    </p:tnLst>
-  </p:timing>
 </p:sld>
 </file>
 
@@ -9722,7 +9581,7 @@
           <a:lstStyle/>
           <a:p>
             <a:r>
-              <a:rPr lang="en-US" dirty="0" smtClean="0"/>
+              <a:rPr lang="en-US" dirty="0"/>
               <a:t>Encrypt-and-MAC</a:t>
             </a:r>
             <a:endParaRPr lang="ru-RU" dirty="0"/>
@@ -9750,7 +9609,7 @@
                   <a:buNone/>
                 </a:pPr>
                 <a:r>
-                  <a:rPr lang="ru-RU" dirty="0" smtClean="0"/>
+                  <a:rPr lang="ru-RU" dirty="0"/>
                   <a:t>Пусть </a:t>
                 </a:r>
                 <a14:m>
@@ -10977,13 +10836,6 @@
   <p:clrMapOvr>
     <a:masterClrMapping/>
   </p:clrMapOvr>
-  <p:timing>
-    <p:tnLst>
-      <p:par>
-        <p:cTn id="1" dur="indefinite" restart="never" nodeType="tmRoot"/>
-      </p:par>
-    </p:tnLst>
-  </p:timing>
 </p:sld>
 </file>
 
@@ -11060,15 +10912,11 @@
             </a:r>
             <a:r>
               <a:rPr lang="ru-RU" dirty="0"/>
-              <a:t>и </a:t>
-            </a:r>
-            <a:r>
-              <a:rPr lang="ru-RU" dirty="0" smtClean="0"/>
-              <a:t>шифрования</a:t>
-            </a:r>
-          </a:p>
-          <a:p>
-            <a:endParaRPr lang="ru-RU" dirty="0" smtClean="0"/>
+              <a:t>и шифрования</a:t>
+            </a:r>
+          </a:p>
+          <a:p>
+            <a:endParaRPr lang="ru-RU" dirty="0"/>
           </a:p>
           <a:p>
             <a:r>
@@ -11089,11 +10937,7 @@
             </a:r>
             <a:r>
               <a:rPr lang="ru-RU" dirty="0"/>
-              <a:t>в общем </a:t>
-            </a:r>
-            <a:r>
-              <a:rPr lang="ru-RU" dirty="0" smtClean="0"/>
-              <a:t>случае</a:t>
+              <a:t>в общем случае</a:t>
             </a:r>
           </a:p>
           <a:p>
@@ -11101,23 +10945,23 @@
           </a:p>
           <a:p>
             <a:r>
-              <a:rPr lang="ru-RU" dirty="0" smtClean="0"/>
+              <a:rPr lang="ru-RU" dirty="0"/>
               <a:t>Вообще говоря, из </a:t>
             </a:r>
             <a:r>
-              <a:rPr lang="en-US" dirty="0" smtClean="0"/>
+              <a:rPr lang="en-US" dirty="0"/>
               <a:t>MAC </a:t>
             </a:r>
             <a:r>
-              <a:rPr lang="ru-RU" dirty="0" smtClean="0"/>
+              <a:rPr lang="ru-RU" dirty="0"/>
               <a:t>можно восстановить часть сообщения (на стойкий </a:t>
             </a:r>
             <a:r>
-              <a:rPr lang="en-US" dirty="0" smtClean="0"/>
+              <a:rPr lang="en-US" dirty="0"/>
               <a:t>MAC </a:t>
             </a:r>
             <a:r>
-              <a:rPr lang="ru-RU" dirty="0" smtClean="0"/>
+              <a:rPr lang="ru-RU" dirty="0"/>
               <a:t>не накладывается требования не раскрывать биты сообщения)</a:t>
             </a:r>
           </a:p>
@@ -11162,13 +11006,6 @@
   <p:clrMapOvr>
     <a:masterClrMapping/>
   </p:clrMapOvr>
-  <p:timing>
-    <p:tnLst>
-      <p:par>
-        <p:cTn id="1" dur="indefinite" restart="never" nodeType="tmRoot"/>
-      </p:par>
-    </p:tnLst>
-  </p:timing>
 </p:sld>
 </file>
 
@@ -11205,10 +11042,9 @@
           <a:lstStyle/>
           <a:p>
             <a:r>
-              <a:rPr lang="ru-RU" dirty="0" smtClean="0"/>
+              <a:rPr lang="ru-RU" dirty="0"/>
               <a:t>Криптографическая защита информации</a:t>
             </a:r>
-            <a:endParaRPr lang="ru-RU" dirty="0"/>
           </a:p>
         </p:txBody>
       </p:sp>
@@ -11231,44 +11067,43 @@
               <a:buNone/>
             </a:pPr>
             <a:r>
-              <a:rPr lang="ru-RU" dirty="0" smtClean="0"/>
+              <a:rPr lang="ru-RU" dirty="0"/>
               <a:t>Обеспечение конфиденциальности</a:t>
             </a:r>
+          </a:p>
+          <a:p>
+            <a:r>
+              <a:rPr lang="ru-RU" dirty="0"/>
+              <a:t>Защита только против пассивных противников (не вносящих изменения в канал связи)</a:t>
+            </a:r>
+          </a:p>
+          <a:p>
+            <a:r>
+              <a:rPr lang="ru-RU" dirty="0"/>
+              <a:t>Поточные и блочные шифры</a:t>
+            </a:r>
+          </a:p>
+          <a:p>
             <a:endParaRPr lang="ru-RU" dirty="0"/>
-          </a:p>
-          <a:p>
-            <a:r>
-              <a:rPr lang="ru-RU" dirty="0" smtClean="0"/>
-              <a:t>Защита только против пассивных противников (не вносящих изменения в канал связи)</a:t>
-            </a:r>
-          </a:p>
-          <a:p>
-            <a:r>
-              <a:rPr lang="ru-RU" dirty="0" smtClean="0"/>
-              <a:t>Поточные и блочные шифры</a:t>
-            </a:r>
-          </a:p>
-          <a:p>
-            <a:endParaRPr lang="ru-RU" dirty="0" smtClean="0"/>
           </a:p>
           <a:p>
             <a:pPr marL="0" indent="0">
               <a:buNone/>
             </a:pPr>
             <a:r>
-              <a:rPr lang="ru-RU" dirty="0" smtClean="0"/>
+              <a:rPr lang="ru-RU" dirty="0"/>
               <a:t>Обеспечение целостности</a:t>
             </a:r>
           </a:p>
           <a:p>
             <a:r>
-              <a:rPr lang="ru-RU" dirty="0" smtClean="0"/>
+              <a:rPr lang="ru-RU" dirty="0"/>
               <a:t>Защита от подделки при атаке по выбранным сообщениям</a:t>
             </a:r>
           </a:p>
           <a:p>
             <a:r>
-              <a:rPr lang="en-US" dirty="0" smtClean="0"/>
+              <a:rPr lang="en-US" dirty="0"/>
               <a:t>CBC-MAC, HMAC</a:t>
             </a:r>
             <a:endParaRPr lang="ru-RU" dirty="0"/>
@@ -11308,13 +11143,6 @@
   <p:clrMapOvr>
     <a:masterClrMapping/>
   </p:clrMapOvr>
-  <p:timing>
-    <p:tnLst>
-      <p:par>
-        <p:cTn id="1" dur="indefinite" restart="never" nodeType="tmRoot"/>
-      </p:par>
-    </p:tnLst>
-  </p:timing>
 </p:sld>
 </file>
 
@@ -11351,10 +11179,9 @@
           <a:lstStyle/>
           <a:p>
             <a:r>
-              <a:rPr lang="ru-RU" dirty="0" smtClean="0"/>
+              <a:rPr lang="ru-RU" dirty="0"/>
               <a:t>Режимы аутентифицированного шифрования</a:t>
             </a:r>
-            <a:endParaRPr lang="ru-RU" dirty="0"/>
           </a:p>
         </p:txBody>
       </p:sp>
@@ -11377,15 +11204,15 @@
               <a:buNone/>
             </a:pPr>
             <a:r>
-              <a:rPr lang="ru-RU" dirty="0" smtClean="0"/>
+              <a:rPr lang="ru-RU" dirty="0"/>
               <a:t>Можем ли мы построить режимы, при которых будет обеспечивать </a:t>
             </a:r>
             <a:r>
-              <a:rPr lang="en-US" dirty="0" smtClean="0"/>
+              <a:rPr lang="en-US" dirty="0"/>
               <a:t>AE </a:t>
             </a:r>
             <a:r>
-              <a:rPr lang="ru-RU" dirty="0" smtClean="0"/>
+              <a:rPr lang="ru-RU" dirty="0"/>
               <a:t>стойкость изначально?</a:t>
             </a:r>
           </a:p>
@@ -11394,11 +11221,11 @@
               <a:buNone/>
             </a:pPr>
             <a:r>
-              <a:rPr lang="ru-RU" dirty="0" smtClean="0"/>
+              <a:rPr lang="ru-RU" dirty="0"/>
               <a:t>Можем – </a:t>
             </a:r>
             <a:r>
-              <a:rPr lang="en-US" dirty="0" smtClean="0"/>
+              <a:rPr lang="en-US" dirty="0"/>
               <a:t>GCM, CCM, EAX, OCB</a:t>
             </a:r>
           </a:p>
@@ -11413,64 +11240,48 @@
               <a:buNone/>
             </a:pPr>
             <a:r>
-              <a:rPr lang="ru-RU" dirty="0" smtClean="0"/>
+              <a:rPr lang="ru-RU" dirty="0"/>
               <a:t>Описанные режимы являются не только </a:t>
             </a:r>
             <a:r>
-              <a:rPr lang="en-US" dirty="0" smtClean="0"/>
+              <a:rPr lang="en-US" dirty="0"/>
               <a:t>AE </a:t>
             </a:r>
             <a:r>
-              <a:rPr lang="ru-RU" dirty="0" smtClean="0"/>
+              <a:rPr lang="ru-RU" dirty="0"/>
               <a:t>шифрованием, но и </a:t>
             </a:r>
             <a:r>
-              <a:rPr lang="en-US" dirty="0" smtClean="0"/>
+              <a:rPr lang="en-US" dirty="0"/>
               <a:t>AEAD</a:t>
             </a:r>
             <a:r>
-              <a:rPr lang="ru-RU" dirty="0" smtClean="0"/>
+              <a:rPr lang="ru-RU" dirty="0"/>
               <a:t> </a:t>
             </a:r>
             <a:r>
-              <a:rPr lang="en-US" dirty="0" smtClean="0"/>
+              <a:rPr lang="en-US" dirty="0"/>
               <a:t>(</a:t>
             </a:r>
             <a:r>
-              <a:rPr lang="en-US" b="1" dirty="0" smtClean="0"/>
-              <a:t>authenticated </a:t>
-            </a:r>
-            <a:r>
               <a:rPr lang="en-US" b="1" dirty="0"/>
-              <a:t>encryption with associated </a:t>
-            </a:r>
-            <a:r>
-              <a:rPr lang="en-US" b="1" dirty="0" smtClean="0"/>
-              <a:t>data)</a:t>
-            </a:r>
-            <a:r>
-              <a:rPr lang="ru-RU" dirty="0" smtClean="0"/>
+              <a:t>authenticated encryption with associated data)</a:t>
+            </a:r>
+            <a:r>
+              <a:rPr lang="ru-RU" dirty="0"/>
               <a:t>, когда часть данных шифруется и аутентифицируется, а часть только аутентифицируется (</a:t>
             </a:r>
             <a:r>
               <a:rPr lang="en-US" b="1" dirty="0"/>
-              <a:t>associated </a:t>
-            </a:r>
-            <a:r>
-              <a:rPr lang="en-US" b="1" dirty="0" smtClean="0"/>
-              <a:t>data</a:t>
-            </a:r>
-            <a:r>
-              <a:rPr lang="ru-RU" b="1" dirty="0" smtClean="0"/>
+              <a:t>associated data</a:t>
+            </a:r>
+            <a:r>
+              <a:rPr lang="ru-RU" b="1" dirty="0"/>
               <a:t>)</a:t>
             </a:r>
             <a:r>
-              <a:rPr lang="ru-RU" dirty="0" smtClean="0"/>
-              <a:t>. Все режимы </a:t>
-            </a:r>
-            <a:r>
               <a:rPr lang="ru-RU" dirty="0"/>
-              <a:t>используют </a:t>
+              <a:t>. Все режимы используют </a:t>
             </a:r>
             <a:r>
               <a:rPr lang="en-US" dirty="0"/>
@@ -11553,13 +11364,6 @@
   <p:clrMapOvr>
     <a:masterClrMapping/>
   </p:clrMapOvr>
-  <p:timing>
-    <p:tnLst>
-      <p:par>
-        <p:cTn id="1" dur="indefinite" restart="never" nodeType="tmRoot"/>
-      </p:par>
-    </p:tnLst>
-  </p:timing>
 </p:sld>
 </file>
 
@@ -11604,7 +11408,7 @@
           <a:p>
             <a:pPr eaLnBrk="1" hangingPunct="1"/>
             <a:r>
-              <a:rPr lang="en-US" dirty="0" smtClean="0"/>
+              <a:rPr lang="en-US" dirty="0"/>
               <a:t>OCB</a:t>
             </a:r>
           </a:p>
@@ -11644,16 +11448,10 @@
               </a:spcBef>
             </a:pPr>
             <a:r>
-              <a:rPr lang="en-US" sz="2667" dirty="0" smtClean="0">
-                <a:latin typeface="Arial" charset="0"/>
-              </a:rPr>
-              <a:t>One </a:t>
-            </a:r>
-            <a:r>
               <a:rPr lang="en-US" sz="2667" dirty="0">
                 <a:latin typeface="Arial" charset="0"/>
               </a:rPr>
-              <a:t>E() op. per block. </a:t>
+              <a:t>One E() op. per block. </a:t>
             </a:r>
           </a:p>
         </p:txBody>
@@ -14332,13 +14130,6 @@
   <p:clrMapOvr>
     <a:masterClrMapping/>
   </p:clrMapOvr>
-  <p:timing>
-    <p:tnLst>
-      <p:par>
-        <p:cTn id="1" dur="indefinite" restart="never" nodeType="tmRoot"/>
-      </p:par>
-    </p:tnLst>
-  </p:timing>
 </p:sld>
 </file>
 
@@ -14446,34 +14237,34 @@
           <a:lstStyle/>
           <a:p>
             <a:r>
-              <a:rPr lang="ru-RU" dirty="0" smtClean="0"/>
+              <a:rPr lang="ru-RU" dirty="0"/>
               <a:t>Полностью </a:t>
             </a:r>
             <a:r>
-              <a:rPr lang="ru-RU" dirty="0" err="1" smtClean="0"/>
+              <a:rPr lang="ru-RU" dirty="0" err="1"/>
               <a:t>параллелизуется</a:t>
             </a:r>
-            <a:endParaRPr lang="ru-RU" dirty="0" smtClean="0"/>
-          </a:p>
-          <a:p>
-            <a:r>
-              <a:rPr lang="ru-RU" dirty="0" smtClean="0"/>
+            <a:endParaRPr lang="ru-RU" dirty="0"/>
+          </a:p>
+          <a:p>
+            <a:r>
+              <a:rPr lang="ru-RU" dirty="0"/>
               <a:t>Патентовано</a:t>
             </a:r>
             <a:r>
-              <a:rPr lang="en-US" dirty="0" smtClean="0"/>
+              <a:rPr lang="en-US" dirty="0"/>
               <a:t> (</a:t>
             </a:r>
             <a:r>
-              <a:rPr lang="ru-RU" dirty="0" smtClean="0"/>
+              <a:rPr lang="ru-RU" dirty="0"/>
               <a:t>спасибо </a:t>
             </a:r>
             <a:r>
-              <a:rPr lang="en-US" dirty="0" err="1" smtClean="0"/>
+              <a:rPr lang="en-US" dirty="0" err="1"/>
               <a:t>Rogaway</a:t>
             </a:r>
             <a:r>
-              <a:rPr lang="en-US" dirty="0" smtClean="0"/>
+              <a:rPr lang="en-US" dirty="0"/>
               <a:t>!)</a:t>
             </a:r>
             <a:endParaRPr lang="ru-RU" dirty="0"/>
@@ -14490,13 +14281,6 @@
   <p:clrMapOvr>
     <a:masterClrMapping/>
   </p:clrMapOvr>
-  <p:timing>
-    <p:tnLst>
-      <p:par>
-        <p:cTn id="1" dur="indefinite" restart="never" nodeType="tmRoot"/>
-      </p:par>
-    </p:tnLst>
-  </p:timing>
 </p:sld>
 </file>
 
@@ -14533,7 +14317,7 @@
           <a:lstStyle/>
           <a:p>
             <a:r>
-              <a:rPr lang="en-US" dirty="0" smtClean="0"/>
+              <a:rPr lang="en-US" dirty="0"/>
               <a:t>GCM</a:t>
             </a:r>
             <a:endParaRPr lang="ru-RU" dirty="0"/>
@@ -14561,46 +14345,46 @@
           <a:lstStyle/>
           <a:p>
             <a:r>
-              <a:rPr lang="en-US" dirty="0" smtClean="0"/>
+              <a:rPr lang="en-US" dirty="0"/>
               <a:t>CTR-mode-then-CW-MAC</a:t>
             </a:r>
-            <a:endParaRPr lang="ru-RU" dirty="0" smtClean="0"/>
-          </a:p>
-          <a:p>
-            <a:r>
-              <a:rPr lang="ru-RU" dirty="0" err="1" smtClean="0"/>
+            <a:endParaRPr lang="ru-RU" dirty="0"/>
+          </a:p>
+          <a:p>
+            <a:r>
+              <a:rPr lang="ru-RU" dirty="0" err="1"/>
               <a:t>Параллелизуется</a:t>
             </a:r>
             <a:r>
-              <a:rPr lang="ru-RU" dirty="0" smtClean="0"/>
+              <a:rPr lang="ru-RU" dirty="0"/>
               <a:t> только шифрование</a:t>
             </a:r>
           </a:p>
           <a:p>
             <a:r>
-              <a:rPr lang="en-US" dirty="0" smtClean="0"/>
+              <a:rPr lang="en-US" dirty="0"/>
               <a:t>MAC </a:t>
             </a:r>
             <a:r>
-              <a:rPr lang="ru-RU" dirty="0" smtClean="0"/>
+              <a:rPr lang="ru-RU" dirty="0"/>
               <a:t>последовательный, не требует вычисления </a:t>
             </a:r>
             <a:r>
-              <a:rPr lang="en-US" dirty="0" smtClean="0"/>
+              <a:rPr lang="en-US" dirty="0"/>
               <a:t>PRP</a:t>
             </a:r>
           </a:p>
           <a:p>
             <a:r>
-              <a:rPr lang="ru-RU" dirty="0" err="1" smtClean="0"/>
+              <a:rPr lang="ru-RU" dirty="0" err="1"/>
               <a:t>Стандрат</a:t>
             </a:r>
             <a:r>
-              <a:rPr lang="ru-RU" dirty="0" smtClean="0"/>
+              <a:rPr lang="ru-RU" dirty="0"/>
               <a:t> </a:t>
             </a:r>
             <a:r>
-              <a:rPr lang="en-US" smtClean="0"/>
+              <a:rPr lang="en-US"/>
               <a:t>NIST</a:t>
             </a:r>
             <a:endParaRPr lang="ru-RU" dirty="0"/>
@@ -14664,13 +14448,6 @@
   <p:clrMapOvr>
     <a:masterClrMapping/>
   </p:clrMapOvr>
-  <p:timing>
-    <p:tnLst>
-      <p:par>
-        <p:cTn id="1" dur="indefinite" restart="never" nodeType="tmRoot"/>
-      </p:par>
-    </p:tnLst>
-  </p:timing>
 </p:sld>
 </file>
 
@@ -14707,7 +14484,7 @@
           <a:lstStyle/>
           <a:p>
             <a:r>
-              <a:rPr lang="en-US" dirty="0" smtClean="0"/>
+              <a:rPr lang="en-US" dirty="0"/>
               <a:t>CCM</a:t>
             </a:r>
             <a:endParaRPr lang="ru-RU" dirty="0"/>
@@ -14735,7 +14512,7 @@
           <a:lstStyle/>
           <a:p>
             <a:r>
-              <a:rPr lang="en-US" dirty="0" smtClean="0"/>
+              <a:rPr lang="en-US" dirty="0"/>
               <a:t>CTR-mode-and-CBC-MAC</a:t>
             </a:r>
           </a:p>
@@ -14809,13 +14586,6 @@
   <p:clrMapOvr>
     <a:masterClrMapping/>
   </p:clrMapOvr>
-  <p:timing>
-    <p:tnLst>
-      <p:par>
-        <p:cTn id="1" dur="indefinite" restart="never" nodeType="tmRoot"/>
-      </p:par>
-    </p:tnLst>
-  </p:timing>
 </p:sld>
 </file>
 
@@ -14852,7 +14622,7 @@
           <a:lstStyle/>
           <a:p>
             <a:r>
-              <a:rPr lang="en-US" dirty="0" smtClean="0"/>
+              <a:rPr lang="en-US" dirty="0"/>
               <a:t>EAX</a:t>
             </a:r>
             <a:endParaRPr lang="ru-RU" dirty="0"/>
@@ -14895,15 +14665,7 @@
             </a:r>
             <a:r>
               <a:rPr lang="ru-RU" dirty="0"/>
-              <a:t>последовательный, </a:t>
-            </a:r>
-            <a:r>
-              <a:rPr lang="ru-RU" dirty="0" smtClean="0"/>
-              <a:t>требует </a:t>
-            </a:r>
-            <a:r>
-              <a:rPr lang="ru-RU" dirty="0"/>
-              <a:t>вычисления </a:t>
+              <a:t>последовательный, требует вычисления </a:t>
             </a:r>
             <a:r>
               <a:rPr lang="en-US" dirty="0"/>
@@ -14970,13 +14732,6 @@
   <p:clrMapOvr>
     <a:masterClrMapping/>
   </p:clrMapOvr>
-  <p:timing>
-    <p:tnLst>
-      <p:par>
-        <p:cTn id="1" dur="indefinite" restart="never" nodeType="tmRoot"/>
-      </p:par>
-    </p:tnLst>
-  </p:timing>
 </p:sld>
 </file>
 
@@ -15013,10 +14768,9 @@
           <a:lstStyle/>
           <a:p>
             <a:r>
-              <a:rPr lang="ru-RU" dirty="0" smtClean="0"/>
+              <a:rPr lang="ru-RU" dirty="0"/>
               <a:t>Выводы</a:t>
             </a:r>
-            <a:endParaRPr lang="ru-RU" dirty="0"/>
           </a:p>
         </p:txBody>
       </p:sp>
@@ -15036,46 +14790,39 @@
           <a:lstStyle/>
           <a:p>
             <a:r>
-              <a:rPr lang="ru-RU" dirty="0" smtClean="0"/>
+              <a:rPr lang="ru-RU" dirty="0"/>
               <a:t>Для построения защищенных каналов необходимо использовать </a:t>
             </a:r>
             <a:r>
-              <a:rPr lang="en-US" dirty="0" smtClean="0"/>
+              <a:rPr lang="en-US" dirty="0"/>
               <a:t>AE </a:t>
             </a:r>
             <a:r>
-              <a:rPr lang="ru-RU" dirty="0" smtClean="0"/>
+              <a:rPr lang="ru-RU" dirty="0"/>
               <a:t>шифрование</a:t>
             </a:r>
           </a:p>
           <a:p>
             <a:r>
-              <a:rPr lang="ru-RU" dirty="0" smtClean="0"/>
+              <a:rPr lang="ru-RU" dirty="0"/>
               <a:t>Лучше использовать </a:t>
             </a:r>
             <a:r>
-              <a:rPr lang="en-US" dirty="0" smtClean="0"/>
+              <a:rPr lang="en-US" dirty="0"/>
               <a:t>Encrypt-Then-MAC </a:t>
             </a:r>
             <a:r>
-              <a:rPr lang="ru-RU" dirty="0" smtClean="0"/>
+              <a:rPr lang="ru-RU" dirty="0"/>
               <a:t>или один из стандартов </a:t>
             </a:r>
             <a:r>
-              <a:rPr lang="en-US" dirty="0" smtClean="0"/>
+              <a:rPr lang="en-US" dirty="0"/>
               <a:t>AEAD </a:t>
             </a:r>
             <a:r>
-              <a:rPr lang="ru-RU" dirty="0" smtClean="0"/>
+              <a:rPr lang="ru-RU" dirty="0"/>
               <a:t>шифрования</a:t>
             </a:r>
-          </a:p>
-          <a:p>
-            <a:r>
-              <a:rPr lang="ru-RU" dirty="0" smtClean="0"/>
-              <a:t>Никогда не реализовывать криптографию!</a:t>
-            </a:r>
-            <a:endParaRPr lang="ru-RU" dirty="0"/>
           </a:p>
         </p:txBody>
       </p:sp>
@@ -15112,13 +14859,6 @@
   <p:clrMapOvr>
     <a:masterClrMapping/>
   </p:clrMapOvr>
-  <p:timing>
-    <p:tnLst>
-      <p:par>
-        <p:cTn id="1" dur="indefinite" restart="never" nodeType="tmRoot"/>
-      </p:par>
-    </p:tnLst>
-  </p:timing>
 </p:sld>
 </file>
 
@@ -15155,10 +14895,9 @@
           <a:lstStyle/>
           <a:p>
             <a:r>
-              <a:rPr lang="ru-RU" dirty="0" smtClean="0"/>
+              <a:rPr lang="ru-RU" dirty="0"/>
               <a:t>Криптографическая защита информации</a:t>
             </a:r>
-            <a:endParaRPr lang="ru-RU" dirty="0"/>
           </a:p>
         </p:txBody>
       </p:sp>
@@ -15181,27 +14920,27 @@
               <a:buNone/>
             </a:pPr>
             <a:r>
-              <a:rPr lang="ru-RU" dirty="0" smtClean="0"/>
+              <a:rPr lang="ru-RU" dirty="0"/>
               <a:t>Аутентифицированное шифрование</a:t>
             </a:r>
           </a:p>
           <a:p>
             <a:r>
-              <a:rPr lang="ru-RU" dirty="0" smtClean="0"/>
+              <a:rPr lang="ru-RU" dirty="0"/>
               <a:t>Шифрование с защитой от подделки </a:t>
             </a:r>
             <a:r>
-              <a:rPr lang="ru-RU" dirty="0" err="1" smtClean="0"/>
+              <a:rPr lang="ru-RU" dirty="0" err="1"/>
               <a:t>шифртекстов</a:t>
             </a:r>
             <a:r>
-              <a:rPr lang="ru-RU" dirty="0" smtClean="0"/>
+              <a:rPr lang="ru-RU" dirty="0"/>
               <a:t> (т.е. обеспечение аутентичности и конфиденциальности)</a:t>
             </a:r>
           </a:p>
           <a:p>
             <a:r>
-              <a:rPr lang="ru-RU" dirty="0" smtClean="0"/>
+              <a:rPr lang="ru-RU" dirty="0"/>
               <a:t>Защита от активных и пассивных противников</a:t>
             </a:r>
           </a:p>
@@ -15240,13 +14979,6 @@
   <p:clrMapOvr>
     <a:masterClrMapping/>
   </p:clrMapOvr>
-  <p:timing>
-    <p:tnLst>
-      <p:par>
-        <p:cTn id="1" dur="indefinite" restart="never" nodeType="tmRoot"/>
-      </p:par>
-    </p:tnLst>
-  </p:timing>
 </p:sld>
 </file>
 
@@ -15285,7 +15017,7 @@
           <a:lstStyle/>
           <a:p>
             <a:r>
-              <a:rPr lang="ru-RU" dirty="0" smtClean="0"/>
+              <a:rPr lang="ru-RU" dirty="0"/>
               <a:t>Пример перехвата сообщений</a:t>
             </a:r>
             <a:endParaRPr lang="en-US" dirty="0"/>
@@ -15316,7 +15048,7 @@
               <a:buNone/>
             </a:pPr>
             <a:r>
-              <a:rPr lang="en-US" dirty="0" smtClean="0"/>
+              <a:rPr lang="en-US" dirty="0"/>
               <a:t>TCP/IP:   (highly abstracted)</a:t>
             </a:r>
           </a:p>
@@ -15936,16 +15668,12 @@
               </a:lnSpc>
             </a:pPr>
             <a:r>
-              <a:rPr lang="ru-RU" sz="2933" dirty="0" smtClean="0"/>
+              <a:rPr lang="ru-RU" sz="2933" dirty="0"/>
               <a:t>Противник получает любые пакеты, имеющие заголовок</a:t>
             </a:r>
             <a:r>
-              <a:rPr lang="en-US" sz="2933" dirty="0" smtClean="0"/>
-              <a:t> </a:t>
-            </a:r>
-            <a:r>
               <a:rPr lang="en-US" sz="2933" dirty="0"/>
-              <a:t>“</a:t>
+              <a:t> “</a:t>
             </a:r>
             <a:r>
               <a:rPr lang="en-US" sz="2933" dirty="0" err="1"/>
@@ -15971,13 +15699,6 @@
   <p:clrMapOvr>
     <a:masterClrMapping/>
   </p:clrMapOvr>
-  <p:timing>
-    <p:tnLst>
-      <p:par>
-        <p:cTn id="1" dur="indefinite" restart="never" nodeType="tmRoot"/>
-      </p:par>
-    </p:tnLst>
-  </p:timing>
 </p:sld>
 </file>
 
@@ -16047,11 +15768,11 @@
               <a:buNone/>
             </a:pPr>
             <a:r>
-              <a:rPr lang="en-US" dirty="0" err="1" smtClean="0"/>
+              <a:rPr lang="en-US" dirty="0" err="1"/>
               <a:t>IPsec</a:t>
             </a:r>
             <a:r>
-              <a:rPr lang="en-US" dirty="0" smtClean="0"/>
+              <a:rPr lang="en-US" dirty="0"/>
               <a:t>:  (highly abstracted)</a:t>
             </a:r>
           </a:p>
@@ -18271,10 +17992,9 @@
           <a:lstStyle/>
           <a:p>
             <a:r>
-              <a:rPr lang="ru-RU" dirty="0" smtClean="0"/>
+              <a:rPr lang="ru-RU" dirty="0"/>
               <a:t>Выводы</a:t>
             </a:r>
-            <a:endParaRPr lang="ru-RU" dirty="0"/>
           </a:p>
         </p:txBody>
       </p:sp>
@@ -18297,7 +18017,7 @@
               <a:buNone/>
             </a:pPr>
             <a:r>
-              <a:rPr lang="ru-RU" dirty="0" smtClean="0"/>
+              <a:rPr lang="ru-RU" dirty="0"/>
               <a:t>Стойкое шифрование не гарантирует стойкость против активных противников</a:t>
             </a:r>
           </a:p>
@@ -18312,30 +18032,29 @@
               <a:buNone/>
             </a:pPr>
             <a:r>
-              <a:rPr lang="ru-RU" dirty="0" smtClean="0"/>
+              <a:rPr lang="ru-RU" dirty="0"/>
               <a:t>Для обеспечения безопасности</a:t>
             </a:r>
             <a:r>
-              <a:rPr lang="en-US" dirty="0" smtClean="0"/>
+              <a:rPr lang="en-US" dirty="0"/>
               <a:t>:</a:t>
             </a:r>
           </a:p>
           <a:p>
             <a:r>
-              <a:rPr lang="ru-RU" dirty="0" smtClean="0"/>
+              <a:rPr lang="ru-RU" dirty="0"/>
               <a:t>Если необходимо обеспечить целостность, но не конфиденциальность - нужно использовать </a:t>
             </a:r>
             <a:r>
-              <a:rPr lang="en-US" dirty="0" smtClean="0"/>
+              <a:rPr lang="en-US" dirty="0"/>
               <a:t>MAC</a:t>
             </a:r>
           </a:p>
           <a:p>
             <a:r>
-              <a:rPr lang="ru-RU" dirty="0" smtClean="0"/>
+              <a:rPr lang="ru-RU" dirty="0"/>
               <a:t>Если необходимо обеспечить конфиденциальность и целостность – использовать аутентифицированное шифрование</a:t>
             </a:r>
-            <a:endParaRPr lang="ru-RU" dirty="0"/>
           </a:p>
         </p:txBody>
       </p:sp>
@@ -18372,13 +18091,6 @@
   <p:clrMapOvr>
     <a:masterClrMapping/>
   </p:clrMapOvr>
-  <p:timing>
-    <p:tnLst>
-      <p:par>
-        <p:cTn id="1" dur="indefinite" restart="never" nodeType="tmRoot"/>
-      </p:par>
-    </p:tnLst>
-  </p:timing>
 </p:sld>
 </file>
 
@@ -18444,7 +18156,7 @@
                   <a:buNone/>
                 </a:pPr>
                 <a:r>
-                  <a:rPr lang="ru-RU" dirty="0" smtClean="0"/>
+                  <a:rPr lang="ru-RU" dirty="0"/>
                   <a:t>Введём понятие аутентифицированного шифра.</a:t>
                 </a:r>
               </a:p>
@@ -18496,11 +18208,11 @@
                   </m:oMath>
                 </a14:m>
                 <a:r>
-                  <a:rPr lang="en-US" dirty="0" smtClean="0"/>
+                  <a:rPr lang="en-US" dirty="0"/>
                   <a:t> </a:t>
                 </a:r>
                 <a:r>
-                  <a:rPr lang="ru-RU" dirty="0" smtClean="0"/>
+                  <a:rPr lang="ru-RU" dirty="0"/>
                   <a:t>аутентифицированный шифр на </a:t>
                 </a:r>
                 <a14:m>
@@ -18550,7 +18262,7 @@
                   </m:oMath>
                 </a14:m>
                 <a:r>
-                  <a:rPr lang="ru-RU" dirty="0" smtClean="0"/>
+                  <a:rPr lang="ru-RU" dirty="0"/>
                   <a:t>.</a:t>
                 </a:r>
               </a:p>
@@ -18601,7 +18313,7 @@
                     </m:r>
                   </m:oMath>
                 </a14:m>
-                <a:endParaRPr lang="en-US" b="0" dirty="0" smtClean="0"/>
+                <a:endParaRPr lang="en-US" b="0" dirty="0"/>
               </a:p>
               <a:p>
                 <a14:m>
@@ -18657,7 +18369,7 @@
                     </m:r>
                   </m:oMath>
                 </a14:m>
-                <a:endParaRPr lang="en-US" dirty="0" smtClean="0"/>
+                <a:endParaRPr lang="en-US" dirty="0"/>
               </a:p>
               <a:p>
                 <a14:m>
@@ -18671,15 +18383,15 @@
                   </m:oMath>
                 </a14:m>
                 <a:r>
-                  <a:rPr lang="ru-RU" dirty="0" smtClean="0"/>
+                  <a:rPr lang="ru-RU" dirty="0"/>
                   <a:t> - </a:t>
                 </a:r>
                 <a:r>
-                  <a:rPr lang="ru-RU" dirty="0" err="1" smtClean="0"/>
+                  <a:rPr lang="ru-RU" dirty="0" err="1"/>
                   <a:t>шифртекст</a:t>
                 </a:r>
                 <a:r>
-                  <a:rPr lang="ru-RU" dirty="0" smtClean="0"/>
+                  <a:rPr lang="ru-RU" dirty="0"/>
                   <a:t> отклонён (не пройдена проверка аутентичности)</a:t>
                 </a:r>
               </a:p>
@@ -18688,38 +18400,38 @@
               </a:p>
               <a:p>
                 <a:r>
-                  <a:rPr lang="en-US" dirty="0" smtClean="0"/>
+                  <a:rPr lang="en-US" dirty="0"/>
                   <a:t>CI – </a:t>
                 </a:r>
                 <a:r>
-                  <a:rPr lang="ru-RU" dirty="0" smtClean="0"/>
+                  <a:rPr lang="ru-RU" dirty="0"/>
                   <a:t>(</a:t>
                 </a:r>
                 <a:r>
-                  <a:rPr lang="en-US" dirty="0" err="1" smtClean="0"/>
+                  <a:rPr lang="en-US" dirty="0" err="1"/>
                   <a:t>ciphertext</a:t>
                 </a:r>
                 <a:r>
-                  <a:rPr lang="en-US" dirty="0" smtClean="0"/>
+                  <a:rPr lang="en-US" dirty="0"/>
                   <a:t> integrity</a:t>
                 </a:r>
                 <a:r>
-                  <a:rPr lang="ru-RU" dirty="0" smtClean="0"/>
+                  <a:rPr lang="ru-RU" dirty="0"/>
                   <a:t>) целостность </a:t>
                 </a:r>
                 <a:r>
-                  <a:rPr lang="ru-RU" dirty="0" err="1" smtClean="0"/>
+                  <a:rPr lang="ru-RU" dirty="0" err="1"/>
                   <a:t>шифртекстов</a:t>
                 </a:r>
-                <a:endParaRPr lang="ru-RU" dirty="0" smtClean="0"/>
+                <a:endParaRPr lang="ru-RU" dirty="0"/>
               </a:p>
               <a:p>
                 <a:r>
-                  <a:rPr lang="en-US" dirty="0" smtClean="0"/>
+                  <a:rPr lang="en-US" dirty="0"/>
                   <a:t>PI – (plaintext integrity) </a:t>
                 </a:r>
                 <a:r>
-                  <a:rPr lang="ru-RU" dirty="0" smtClean="0"/>
+                  <a:rPr lang="ru-RU" dirty="0"/>
                   <a:t>целостность открытых текстов</a:t>
                 </a:r>
               </a:p>
@@ -18799,13 +18511,6 @@
   <p:clrMapOvr>
     <a:masterClrMapping/>
   </p:clrMapOvr>
-  <p:timing>
-    <p:tnLst>
-      <p:par>
-        <p:cTn id="1" dur="indefinite" restart="never" nodeType="tmRoot"/>
-      </p:par>
-    </p:tnLst>
-  </p:timing>
 </p:sld>
 </file>
 
@@ -18842,22 +18547,21 @@
           <a:lstStyle/>
           <a:p>
             <a:r>
-              <a:rPr lang="en-US" dirty="0" smtClean="0"/>
+              <a:rPr lang="en-US" dirty="0"/>
               <a:t>CA </a:t>
             </a:r>
             <a:r>
-              <a:rPr lang="ru-RU" dirty="0" smtClean="0"/>
+              <a:rPr lang="ru-RU" dirty="0"/>
               <a:t>и </a:t>
             </a:r>
             <a:r>
-              <a:rPr lang="en-US" dirty="0" smtClean="0"/>
+              <a:rPr lang="en-US" dirty="0"/>
               <a:t>CI </a:t>
             </a:r>
             <a:r>
-              <a:rPr lang="ru-RU" dirty="0" smtClean="0"/>
+              <a:rPr lang="ru-RU" dirty="0"/>
               <a:t>стойкость</a:t>
             </a:r>
-            <a:endParaRPr lang="ru-RU" dirty="0"/>
           </a:p>
         </p:txBody>
       </p:sp>
@@ -18877,66 +18581,62 @@
           <a:lstStyle/>
           <a:p>
             <a:r>
-              <a:rPr lang="en-US" dirty="0" smtClean="0"/>
+              <a:rPr lang="en-US" dirty="0"/>
               <a:t>CI </a:t>
             </a:r>
             <a:r>
-              <a:rPr lang="ru-RU" dirty="0" smtClean="0"/>
+              <a:rPr lang="ru-RU" dirty="0"/>
               <a:t>более сильное понятие стойкости</a:t>
             </a:r>
-            <a:endParaRPr lang="en-US" dirty="0" smtClean="0"/>
-          </a:p>
-          <a:p>
-            <a:r>
-              <a:rPr lang="en-US" dirty="0" smtClean="0"/>
+            <a:endParaRPr lang="en-US" dirty="0"/>
+          </a:p>
+          <a:p>
+            <a:r>
+              <a:rPr lang="en-US" dirty="0"/>
               <a:t>CI </a:t>
             </a:r>
             <a:r>
-              <a:rPr lang="ru-RU" dirty="0" smtClean="0"/>
+              <a:rPr lang="ru-RU" dirty="0"/>
               <a:t>стойкость говорит, что сложно навязать новый </a:t>
             </a:r>
             <a:r>
-              <a:rPr lang="ru-RU" dirty="0" err="1" smtClean="0"/>
+              <a:rPr lang="ru-RU" dirty="0" err="1"/>
               <a:t>шифртекст</a:t>
             </a:r>
             <a:r>
-              <a:rPr lang="ru-RU" dirty="0" smtClean="0"/>
+              <a:rPr lang="ru-RU" dirty="0"/>
               <a:t> получателю</a:t>
             </a:r>
           </a:p>
           <a:p>
             <a:r>
               <a:rPr lang="en-US" dirty="0"/>
-              <a:t>P</a:t>
-            </a:r>
-            <a:r>
-              <a:rPr lang="en-US" dirty="0" smtClean="0"/>
-              <a:t>I </a:t>
-            </a:r>
-            <a:r>
-              <a:rPr lang="ru-RU" dirty="0" smtClean="0"/>
+              <a:t>PI </a:t>
+            </a:r>
+            <a:r>
+              <a:rPr lang="ru-RU" dirty="0"/>
               <a:t>стойкость говорит, что сложно навязать новые расшифрованные данные получателю</a:t>
             </a:r>
           </a:p>
           <a:p>
             <a:r>
-              <a:rPr lang="ru-RU" dirty="0" smtClean="0"/>
+              <a:rPr lang="ru-RU" dirty="0"/>
               <a:t>Возможно существование шифра </a:t>
             </a:r>
             <a:r>
-              <a:rPr lang="en-US" dirty="0" smtClean="0"/>
+              <a:rPr lang="en-US" dirty="0"/>
               <a:t>PI </a:t>
             </a:r>
             <a:r>
-              <a:rPr lang="ru-RU" dirty="0" smtClean="0"/>
+              <a:rPr lang="ru-RU" dirty="0"/>
               <a:t>стойкого, но не </a:t>
             </a:r>
             <a:r>
-              <a:rPr lang="en-US" dirty="0" smtClean="0"/>
+              <a:rPr lang="en-US" dirty="0"/>
               <a:t>CI </a:t>
             </a:r>
             <a:r>
-              <a:rPr lang="ru-RU" dirty="0" smtClean="0"/>
+              <a:rPr lang="ru-RU" dirty="0"/>
               <a:t>стойкого</a:t>
             </a:r>
           </a:p>
@@ -18945,67 +18645,67 @@
               <a:buNone/>
             </a:pPr>
             <a:r>
-              <a:rPr lang="ru-RU" dirty="0" smtClean="0"/>
+              <a:rPr lang="ru-RU" dirty="0"/>
               <a:t>Например – пусть шифр недетерминированный. Тогда одному </a:t>
             </a:r>
             <a:r>
-              <a:rPr lang="en-US" dirty="0" smtClean="0"/>
+              <a:rPr lang="en-US" dirty="0"/>
               <a:t>PT </a:t>
             </a:r>
             <a:r>
-              <a:rPr lang="ru-RU" dirty="0" smtClean="0"/>
+              <a:rPr lang="ru-RU" dirty="0"/>
               <a:t>соответствует множество </a:t>
             </a:r>
             <a:r>
-              <a:rPr lang="en-US" dirty="0" smtClean="0"/>
+              <a:rPr lang="en-US" dirty="0"/>
               <a:t>CT</a:t>
             </a:r>
             <a:r>
-              <a:rPr lang="ru-RU" dirty="0" smtClean="0"/>
+              <a:rPr lang="ru-RU" dirty="0"/>
               <a:t>. Если противник может создавать </a:t>
             </a:r>
             <a:r>
-              <a:rPr lang="ru-RU" b="1" dirty="0" smtClean="0"/>
+              <a:rPr lang="ru-RU" b="1" dirty="0"/>
               <a:t>новые </a:t>
             </a:r>
             <a:r>
-              <a:rPr lang="en-US" b="1" dirty="0" smtClean="0"/>
+              <a:rPr lang="en-US" b="1" dirty="0"/>
               <a:t>CT </a:t>
             </a:r>
             <a:r>
-              <a:rPr lang="ru-RU" dirty="0" smtClean="0"/>
+              <a:rPr lang="ru-RU" dirty="0"/>
               <a:t>для </a:t>
             </a:r>
             <a:r>
-              <a:rPr lang="ru-RU" b="1" dirty="0" smtClean="0"/>
+              <a:rPr lang="ru-RU" b="1" dirty="0"/>
               <a:t>существующих сообщений</a:t>
             </a:r>
             <a:r>
-              <a:rPr lang="ru-RU" dirty="0" smtClean="0"/>
+              <a:rPr lang="ru-RU" dirty="0"/>
               <a:t>, </a:t>
             </a:r>
             <a:r>
-              <a:rPr lang="ru-RU" b="1" dirty="0" smtClean="0"/>
+              <a:rPr lang="ru-RU" b="1" dirty="0"/>
               <a:t>но не может для новых </a:t>
             </a:r>
             <a:r>
-              <a:rPr lang="ru-RU" dirty="0" smtClean="0"/>
+              <a:rPr lang="ru-RU" dirty="0"/>
               <a:t>то он </a:t>
             </a:r>
             <a:r>
-              <a:rPr lang="en-US" dirty="0" smtClean="0"/>
+              <a:rPr lang="en-US" dirty="0"/>
               <a:t>PI</a:t>
             </a:r>
             <a:r>
-              <a:rPr lang="ru-RU" dirty="0" smtClean="0"/>
+              <a:rPr lang="ru-RU" dirty="0"/>
               <a:t>, но не </a:t>
             </a:r>
             <a:r>
-              <a:rPr lang="en-US" dirty="0" smtClean="0"/>
+              <a:rPr lang="en-US" dirty="0"/>
               <a:t>CI </a:t>
             </a:r>
             <a:r>
-              <a:rPr lang="ru-RU" dirty="0" smtClean="0"/>
+              <a:rPr lang="ru-RU" dirty="0"/>
               <a:t>стойкий.</a:t>
             </a:r>
           </a:p>

</xml_diff>